<commit_message>
PPT has been updated. Prototype will be presented next week.
</commit_message>
<xml_diff>
--- a/Laser Cat (concept paper).pptx
+++ b/Laser Cat (concept paper).pptx
@@ -452,7 +452,7 @@
             <a:fld id="{B61BEF0D-F0BB-DE4B-95CE-6DB70DBA9567}" type="datetimeFigureOut">
               <a:rPr lang="en-US" dirty="0"/>
               <a:pPr/>
-              <a:t>8/25/2014</a:t>
+              <a:t>8/28/2014</a:t>
             </a:fld>
             <a:endParaRPr lang="en-US" dirty="0"/>
           </a:p>
@@ -773,7 +773,7 @@
             <a:fld id="{B61BEF0D-F0BB-DE4B-95CE-6DB70DBA9567}" type="datetimeFigureOut">
               <a:rPr lang="en-US" dirty="0"/>
               <a:pPr/>
-              <a:t>8/25/2014</a:t>
+              <a:t>8/28/2014</a:t>
             </a:fld>
             <a:endParaRPr lang="en-US" dirty="0"/>
           </a:p>
@@ -1018,7 +1018,7 @@
             <a:fld id="{B61BEF0D-F0BB-DE4B-95CE-6DB70DBA9567}" type="datetimeFigureOut">
               <a:rPr lang="en-US" dirty="0"/>
               <a:pPr/>
-              <a:t>8/25/2014</a:t>
+              <a:t>8/28/2014</a:t>
             </a:fld>
             <a:endParaRPr lang="en-US" dirty="0"/>
           </a:p>
@@ -1354,7 +1354,7 @@
             <a:fld id="{B61BEF0D-F0BB-DE4B-95CE-6DB70DBA9567}" type="datetimeFigureOut">
               <a:rPr lang="en-US" dirty="0"/>
               <a:pPr/>
-              <a:t>8/25/2014</a:t>
+              <a:t>8/28/2014</a:t>
             </a:fld>
             <a:endParaRPr lang="en-US" dirty="0"/>
           </a:p>
@@ -1698,7 +1698,7 @@
             <a:fld id="{B61BEF0D-F0BB-DE4B-95CE-6DB70DBA9567}" type="datetimeFigureOut">
               <a:rPr lang="en-US" dirty="0"/>
               <a:pPr/>
-              <a:t>8/25/2014</a:t>
+              <a:t>8/28/2014</a:t>
             </a:fld>
             <a:endParaRPr lang="en-US" dirty="0"/>
           </a:p>
@@ -2069,7 +2069,7 @@
             <a:fld id="{B61BEF0D-F0BB-DE4B-95CE-6DB70DBA9567}" type="datetimeFigureOut">
               <a:rPr lang="en-US" dirty="0"/>
               <a:pPr/>
-              <a:t>8/25/2014</a:t>
+              <a:t>8/28/2014</a:t>
             </a:fld>
             <a:endParaRPr lang="en-US" dirty="0"/>
           </a:p>
@@ -2536,7 +2536,7 @@
             <a:fld id="{B61BEF0D-F0BB-DE4B-95CE-6DB70DBA9567}" type="datetimeFigureOut">
               <a:rPr lang="en-US" dirty="0"/>
               <a:pPr/>
-              <a:t>8/25/2014</a:t>
+              <a:t>8/28/2014</a:t>
             </a:fld>
             <a:endParaRPr lang="en-US" dirty="0"/>
           </a:p>
@@ -2738,7 +2738,7 @@
             <a:fld id="{B61BEF0D-F0BB-DE4B-95CE-6DB70DBA9567}" type="datetimeFigureOut">
               <a:rPr lang="en-US" dirty="0"/>
               <a:pPr/>
-              <a:t>8/25/2014</a:t>
+              <a:t>8/28/2014</a:t>
             </a:fld>
             <a:endParaRPr lang="en-US" dirty="0"/>
           </a:p>
@@ -2946,7 +2946,7 @@
             <a:fld id="{B61BEF0D-F0BB-DE4B-95CE-6DB70DBA9567}" type="datetimeFigureOut">
               <a:rPr lang="en-US" dirty="0"/>
               <a:pPr/>
-              <a:t>8/25/2014</a:t>
+              <a:t>8/28/2014</a:t>
             </a:fld>
             <a:endParaRPr lang="en-US" dirty="0"/>
           </a:p>
@@ -3174,7 +3174,7 @@
           <a:p>
             <a:fld id="{52647F38-B617-4D2F-AE0A-013F0C4D2C57}" type="datetimeFigureOut">
               <a:rPr lang="en-US" dirty="0"/>
-              <a:t>8/25/2014</a:t>
+              <a:t>8/28/2014</a:t>
             </a:fld>
             <a:endParaRPr lang="en-US" dirty="0"/>
           </a:p>
@@ -3418,7 +3418,7 @@
             <a:fld id="{B61BEF0D-F0BB-DE4B-95CE-6DB70DBA9567}" type="datetimeFigureOut">
               <a:rPr lang="en-US" dirty="0"/>
               <a:pPr/>
-              <a:t>8/25/2014</a:t>
+              <a:t>8/28/2014</a:t>
             </a:fld>
             <a:endParaRPr lang="en-US" dirty="0"/>
           </a:p>
@@ -3712,7 +3712,7 @@
           <a:p>
             <a:fld id="{05BFA754-D5C3-4E66-96A6-867B257F58DC}" type="datetimeFigureOut">
               <a:rPr lang="en-US" dirty="0"/>
-              <a:t>8/25/2014</a:t>
+              <a:t>8/28/2014</a:t>
             </a:fld>
             <a:endParaRPr lang="en-US" dirty="0"/>
           </a:p>
@@ -4102,7 +4102,7 @@
             <a:fld id="{B61BEF0D-F0BB-DE4B-95CE-6DB70DBA9567}" type="datetimeFigureOut">
               <a:rPr lang="en-US" dirty="0"/>
               <a:pPr/>
-              <a:t>8/25/2014</a:t>
+              <a:t>8/28/2014</a:t>
             </a:fld>
             <a:endParaRPr lang="en-US" dirty="0"/>
           </a:p>
@@ -4248,7 +4248,7 @@
             <a:fld id="{B61BEF0D-F0BB-DE4B-95CE-6DB70DBA9567}" type="datetimeFigureOut">
               <a:rPr lang="en-US" dirty="0"/>
               <a:pPr/>
-              <a:t>8/25/2014</a:t>
+              <a:t>8/28/2014</a:t>
             </a:fld>
             <a:endParaRPr lang="en-US" dirty="0"/>
           </a:p>
@@ -4371,7 +4371,7 @@
             <a:fld id="{B61BEF0D-F0BB-DE4B-95CE-6DB70DBA9567}" type="datetimeFigureOut">
               <a:rPr lang="en-US" dirty="0"/>
               <a:pPr/>
-              <a:t>8/25/2014</a:t>
+              <a:t>8/28/2014</a:t>
             </a:fld>
             <a:endParaRPr lang="en-US" dirty="0"/>
           </a:p>
@@ -4623,7 +4623,7 @@
             <a:fld id="{B61BEF0D-F0BB-DE4B-95CE-6DB70DBA9567}" type="datetimeFigureOut">
               <a:rPr lang="en-US" dirty="0"/>
               <a:pPr/>
-              <a:t>8/25/2014</a:t>
+              <a:t>8/28/2014</a:t>
             </a:fld>
             <a:endParaRPr lang="en-US" dirty="0"/>
           </a:p>
@@ -4935,7 +4935,7 @@
             <a:fld id="{B61BEF0D-F0BB-DE4B-95CE-6DB70DBA9567}" type="datetimeFigureOut">
               <a:rPr lang="en-US" dirty="0"/>
               <a:pPr/>
-              <a:t>8/25/2014</a:t>
+              <a:t>8/28/2014</a:t>
             </a:fld>
             <a:endParaRPr lang="en-US" dirty="0"/>
           </a:p>
@@ -5283,7 +5283,7 @@
             <a:fld id="{B61BEF0D-F0BB-DE4B-95CE-6DB70DBA9567}" type="datetimeFigureOut">
               <a:rPr lang="en-US" dirty="0"/>
               <a:pPr/>
-              <a:t>8/25/2014</a:t>
+              <a:t>8/28/2014</a:t>
             </a:fld>
             <a:endParaRPr lang="en-US" dirty="0"/>
           </a:p>
@@ -5858,7 +5858,7 @@
         <p:spPr/>
         <p:txBody>
           <a:bodyPr>
-            <a:normAutofit fontScale="85000" lnSpcReduction="20000"/>
+            <a:normAutofit fontScale="62500" lnSpcReduction="20000"/>
           </a:bodyPr>
           <a:lstStyle/>
           <a:p>
@@ -5911,8 +5911,74 @@
             </a:r>
             <a:endParaRPr lang="en-SG" dirty="0" smtClean="0"/>
           </a:p>
-        </p:txBody>
-      </p:sp>
+          <a:p>
+            <a:r>
+              <a:rPr lang="en-SG" dirty="0" smtClean="0"/>
+              <a:t>Credits are given to the pictures in this presentation</a:t>
+            </a:r>
+          </a:p>
+        </p:txBody>
+      </p:sp>
+      <p:pic>
+        <p:nvPicPr>
+          <p:cNvPr id="4" name="Picture 3"/>
+          <p:cNvPicPr>
+            <a:picLocks noChangeAspect="1"/>
+          </p:cNvPicPr>
+          <p:nvPr/>
+        </p:nvPicPr>
+        <p:blipFill>
+          <a:blip r:embed="rId2">
+            <a:extLst>
+              <a:ext uri="{28A0092B-C50C-407E-A947-70E740481C1C}">
+                <a14:useLocalDpi xmlns:a14="http://schemas.microsoft.com/office/drawing/2010/main" val="0"/>
+              </a:ext>
+            </a:extLst>
+          </a:blip>
+          <a:stretch>
+            <a:fillRect/>
+          </a:stretch>
+        </p:blipFill>
+        <p:spPr>
+          <a:xfrm>
+            <a:off x="-1" y="4382216"/>
+            <a:ext cx="4209691" cy="2475784"/>
+          </a:xfrm>
+          <a:prstGeom prst="rect">
+            <a:avLst/>
+          </a:prstGeom>
+        </p:spPr>
+      </p:pic>
+      <p:pic>
+        <p:nvPicPr>
+          <p:cNvPr id="5" name="Picture 4"/>
+          <p:cNvPicPr>
+            <a:picLocks noChangeAspect="1"/>
+          </p:cNvPicPr>
+          <p:nvPr/>
+        </p:nvPicPr>
+        <p:blipFill>
+          <a:blip r:embed="rId3">
+            <a:extLst>
+              <a:ext uri="{28A0092B-C50C-407E-A947-70E740481C1C}">
+                <a14:useLocalDpi xmlns:a14="http://schemas.microsoft.com/office/drawing/2010/main" val="0"/>
+              </a:ext>
+            </a:extLst>
+          </a:blip>
+          <a:stretch>
+            <a:fillRect/>
+          </a:stretch>
+        </p:blipFill>
+        <p:spPr>
+          <a:xfrm>
+            <a:off x="7418716" y="-8471"/>
+            <a:ext cx="4773283" cy="2906945"/>
+          </a:xfrm>
+          <a:prstGeom prst="rect">
+            <a:avLst/>
+          </a:prstGeom>
+        </p:spPr>
+      </p:pic>
     </p:spTree>
     <p:extLst>
       <p:ext uri="{BB962C8B-B14F-4D97-AF65-F5344CB8AC3E}">
@@ -6026,6 +6092,36 @@
           </a:p>
         </p:txBody>
       </p:sp>
+      <p:pic>
+        <p:nvPicPr>
+          <p:cNvPr id="4" name="Picture 3"/>
+          <p:cNvPicPr>
+            <a:picLocks noChangeAspect="1"/>
+          </p:cNvPicPr>
+          <p:nvPr/>
+        </p:nvPicPr>
+        <p:blipFill>
+          <a:blip r:embed="rId2">
+            <a:extLst>
+              <a:ext uri="{28A0092B-C50C-407E-A947-70E740481C1C}">
+                <a14:useLocalDpi xmlns:a14="http://schemas.microsoft.com/office/drawing/2010/main" val="0"/>
+              </a:ext>
+            </a:extLst>
+          </a:blip>
+          <a:stretch>
+            <a:fillRect/>
+          </a:stretch>
+        </p:blipFill>
+        <p:spPr>
+          <a:xfrm>
+            <a:off x="5460521" y="2225614"/>
+            <a:ext cx="6185140" cy="4113722"/>
+          </a:xfrm>
+          <a:prstGeom prst="rect">
+            <a:avLst/>
+          </a:prstGeom>
+        </p:spPr>
+      </p:pic>
     </p:spTree>
     <p:extLst>
       <p:ext uri="{BB962C8B-B14F-4D97-AF65-F5344CB8AC3E}">
@@ -6279,46 +6375,6 @@
           </a:p>
         </p:txBody>
       </p:sp>
-      <p:sp>
-        <p:nvSpPr>
-          <p:cNvPr id="9" name="Down Arrow 8"/>
-          <p:cNvSpPr/>
-          <p:nvPr/>
-        </p:nvSpPr>
-        <p:spPr>
-          <a:xfrm>
-            <a:off x="5883965" y="4134678"/>
-            <a:ext cx="344554" cy="291548"/>
-          </a:xfrm>
-          <a:prstGeom prst="downArrow">
-            <a:avLst/>
-          </a:prstGeom>
-        </p:spPr>
-        <p:style>
-          <a:lnRef idx="2">
-            <a:schemeClr val="accent1">
-              <a:shade val="50000"/>
-            </a:schemeClr>
-          </a:lnRef>
-          <a:fillRef idx="1">
-            <a:schemeClr val="accent1"/>
-          </a:fillRef>
-          <a:effectRef idx="0">
-            <a:schemeClr val="accent1"/>
-          </a:effectRef>
-          <a:fontRef idx="minor">
-            <a:schemeClr val="lt1"/>
-          </a:fontRef>
-        </p:style>
-        <p:txBody>
-          <a:bodyPr rtlCol="0" anchor="ctr"/>
-          <a:lstStyle/>
-          <a:p>
-            <a:pPr algn="ctr"/>
-            <a:endParaRPr lang="en-SG"/>
-          </a:p>
-        </p:txBody>
-      </p:sp>
     </p:spTree>
     <p:extLst>
       <p:ext uri="{BB962C8B-B14F-4D97-AF65-F5344CB8AC3E}">
@@ -6485,6 +6541,36 @@
           </a:p>
         </p:txBody>
       </p:sp>
+      <p:pic>
+        <p:nvPicPr>
+          <p:cNvPr id="4" name="Picture 3"/>
+          <p:cNvPicPr>
+            <a:picLocks noChangeAspect="1"/>
+          </p:cNvPicPr>
+          <p:nvPr/>
+        </p:nvPicPr>
+        <p:blipFill>
+          <a:blip r:embed="rId2">
+            <a:extLst>
+              <a:ext uri="{28A0092B-C50C-407E-A947-70E740481C1C}">
+                <a14:useLocalDpi xmlns:a14="http://schemas.microsoft.com/office/drawing/2010/main" val="0"/>
+              </a:ext>
+            </a:extLst>
+          </a:blip>
+          <a:stretch>
+            <a:fillRect/>
+          </a:stretch>
+        </p:blipFill>
+        <p:spPr>
+          <a:xfrm>
+            <a:off x="0" y="3829050"/>
+            <a:ext cx="2971800" cy="3028950"/>
+          </a:xfrm>
+          <a:prstGeom prst="rect">
+            <a:avLst/>
+          </a:prstGeom>
+        </p:spPr>
+      </p:pic>
     </p:spTree>
     <p:extLst>
       <p:ext uri="{BB962C8B-B14F-4D97-AF65-F5344CB8AC3E}">
@@ -6738,7 +6824,7 @@
         </p:blipFill>
         <p:spPr>
           <a:xfrm>
-            <a:off x="3952874" y="2285999"/>
+            <a:off x="1295401" y="2285999"/>
             <a:ext cx="4286250" cy="3969027"/>
           </a:xfrm>
           <a:prstGeom prst="rect">
@@ -6821,10 +6907,40 @@
           <a:bodyPr/>
           <a:lstStyle/>
           <a:p>
-            <a:endParaRPr lang="en-SG"/>
-          </a:p>
-        </p:txBody>
-      </p:sp>
+            <a:endParaRPr lang="en-SG" dirty="0"/>
+          </a:p>
+        </p:txBody>
+      </p:sp>
+      <p:pic>
+        <p:nvPicPr>
+          <p:cNvPr id="2" name="Picture 1"/>
+          <p:cNvPicPr>
+            <a:picLocks noChangeAspect="1"/>
+          </p:cNvPicPr>
+          <p:nvPr/>
+        </p:nvPicPr>
+        <p:blipFill>
+          <a:blip r:embed="rId2">
+            <a:extLst>
+              <a:ext uri="{28A0092B-C50C-407E-A947-70E740481C1C}">
+                <a14:useLocalDpi xmlns:a14="http://schemas.microsoft.com/office/drawing/2010/main" val="0"/>
+              </a:ext>
+            </a:extLst>
+          </a:blip>
+          <a:stretch>
+            <a:fillRect/>
+          </a:stretch>
+        </p:blipFill>
+        <p:spPr>
+          <a:xfrm>
+            <a:off x="3699932" y="3248025"/>
+            <a:ext cx="4800600" cy="3609975"/>
+          </a:xfrm>
+          <a:prstGeom prst="rect">
+            <a:avLst/>
+          </a:prstGeom>
+        </p:spPr>
+      </p:pic>
     </p:spTree>
     <p:extLst>
       <p:ext uri="{BB962C8B-B14F-4D97-AF65-F5344CB8AC3E}">

</xml_diff>

<commit_message>
Reference pictures are added for presentation.
</commit_message>
<xml_diff>
--- a/Laser Cat (concept paper).pptx
+++ b/Laser Cat (concept paper).pptx
@@ -6,14 +6,16 @@
   </p:sldMasterIdLst>
   <p:sldIdLst>
     <p:sldId id="256" r:id="rId2"/>
-    <p:sldId id="257" r:id="rId3"/>
-    <p:sldId id="258" r:id="rId4"/>
-    <p:sldId id="259" r:id="rId5"/>
-    <p:sldId id="260" r:id="rId6"/>
-    <p:sldId id="261" r:id="rId7"/>
-    <p:sldId id="262" r:id="rId8"/>
-    <p:sldId id="263" r:id="rId9"/>
-    <p:sldId id="264" r:id="rId10"/>
+    <p:sldId id="265" r:id="rId3"/>
+    <p:sldId id="257" r:id="rId4"/>
+    <p:sldId id="258" r:id="rId5"/>
+    <p:sldId id="259" r:id="rId6"/>
+    <p:sldId id="260" r:id="rId7"/>
+    <p:sldId id="261" r:id="rId8"/>
+    <p:sldId id="262" r:id="rId9"/>
+    <p:sldId id="263" r:id="rId10"/>
+    <p:sldId id="266" r:id="rId11"/>
+    <p:sldId id="264" r:id="rId12"/>
   </p:sldIdLst>
   <p:sldSz cx="12192000" cy="6858000"/>
   <p:notesSz cx="6858000" cy="9144000"/>
@@ -452,7 +454,7 @@
             <a:fld id="{B61BEF0D-F0BB-DE4B-95CE-6DB70DBA9567}" type="datetimeFigureOut">
               <a:rPr lang="en-US" dirty="0"/>
               <a:pPr/>
-              <a:t>8/28/2014</a:t>
+              <a:t>8/29/2014</a:t>
             </a:fld>
             <a:endParaRPr lang="en-US" dirty="0"/>
           </a:p>
@@ -773,7 +775,7 @@
             <a:fld id="{B61BEF0D-F0BB-DE4B-95CE-6DB70DBA9567}" type="datetimeFigureOut">
               <a:rPr lang="en-US" dirty="0"/>
               <a:pPr/>
-              <a:t>8/28/2014</a:t>
+              <a:t>8/29/2014</a:t>
             </a:fld>
             <a:endParaRPr lang="en-US" dirty="0"/>
           </a:p>
@@ -1018,7 +1020,7 @@
             <a:fld id="{B61BEF0D-F0BB-DE4B-95CE-6DB70DBA9567}" type="datetimeFigureOut">
               <a:rPr lang="en-US" dirty="0"/>
               <a:pPr/>
-              <a:t>8/28/2014</a:t>
+              <a:t>8/29/2014</a:t>
             </a:fld>
             <a:endParaRPr lang="en-US" dirty="0"/>
           </a:p>
@@ -1354,7 +1356,7 @@
             <a:fld id="{B61BEF0D-F0BB-DE4B-95CE-6DB70DBA9567}" type="datetimeFigureOut">
               <a:rPr lang="en-US" dirty="0"/>
               <a:pPr/>
-              <a:t>8/28/2014</a:t>
+              <a:t>8/29/2014</a:t>
             </a:fld>
             <a:endParaRPr lang="en-US" dirty="0"/>
           </a:p>
@@ -1698,7 +1700,7 @@
             <a:fld id="{B61BEF0D-F0BB-DE4B-95CE-6DB70DBA9567}" type="datetimeFigureOut">
               <a:rPr lang="en-US" dirty="0"/>
               <a:pPr/>
-              <a:t>8/28/2014</a:t>
+              <a:t>8/29/2014</a:t>
             </a:fld>
             <a:endParaRPr lang="en-US" dirty="0"/>
           </a:p>
@@ -2069,7 +2071,7 @@
             <a:fld id="{B61BEF0D-F0BB-DE4B-95CE-6DB70DBA9567}" type="datetimeFigureOut">
               <a:rPr lang="en-US" dirty="0"/>
               <a:pPr/>
-              <a:t>8/28/2014</a:t>
+              <a:t>8/29/2014</a:t>
             </a:fld>
             <a:endParaRPr lang="en-US" dirty="0"/>
           </a:p>
@@ -2536,7 +2538,7 @@
             <a:fld id="{B61BEF0D-F0BB-DE4B-95CE-6DB70DBA9567}" type="datetimeFigureOut">
               <a:rPr lang="en-US" dirty="0"/>
               <a:pPr/>
-              <a:t>8/28/2014</a:t>
+              <a:t>8/29/2014</a:t>
             </a:fld>
             <a:endParaRPr lang="en-US" dirty="0"/>
           </a:p>
@@ -2738,7 +2740,7 @@
             <a:fld id="{B61BEF0D-F0BB-DE4B-95CE-6DB70DBA9567}" type="datetimeFigureOut">
               <a:rPr lang="en-US" dirty="0"/>
               <a:pPr/>
-              <a:t>8/28/2014</a:t>
+              <a:t>8/29/2014</a:t>
             </a:fld>
             <a:endParaRPr lang="en-US" dirty="0"/>
           </a:p>
@@ -2946,7 +2948,7 @@
             <a:fld id="{B61BEF0D-F0BB-DE4B-95CE-6DB70DBA9567}" type="datetimeFigureOut">
               <a:rPr lang="en-US" dirty="0"/>
               <a:pPr/>
-              <a:t>8/28/2014</a:t>
+              <a:t>8/29/2014</a:t>
             </a:fld>
             <a:endParaRPr lang="en-US" dirty="0"/>
           </a:p>
@@ -3174,7 +3176,7 @@
           <a:p>
             <a:fld id="{52647F38-B617-4D2F-AE0A-013F0C4D2C57}" type="datetimeFigureOut">
               <a:rPr lang="en-US" dirty="0"/>
-              <a:t>8/28/2014</a:t>
+              <a:t>8/29/2014</a:t>
             </a:fld>
             <a:endParaRPr lang="en-US" dirty="0"/>
           </a:p>
@@ -3418,7 +3420,7 @@
             <a:fld id="{B61BEF0D-F0BB-DE4B-95CE-6DB70DBA9567}" type="datetimeFigureOut">
               <a:rPr lang="en-US" dirty="0"/>
               <a:pPr/>
-              <a:t>8/28/2014</a:t>
+              <a:t>8/29/2014</a:t>
             </a:fld>
             <a:endParaRPr lang="en-US" dirty="0"/>
           </a:p>
@@ -3712,7 +3714,7 @@
           <a:p>
             <a:fld id="{05BFA754-D5C3-4E66-96A6-867B257F58DC}" type="datetimeFigureOut">
               <a:rPr lang="en-US" dirty="0"/>
-              <a:t>8/28/2014</a:t>
+              <a:t>8/29/2014</a:t>
             </a:fld>
             <a:endParaRPr lang="en-US" dirty="0"/>
           </a:p>
@@ -4102,7 +4104,7 @@
             <a:fld id="{B61BEF0D-F0BB-DE4B-95CE-6DB70DBA9567}" type="datetimeFigureOut">
               <a:rPr lang="en-US" dirty="0"/>
               <a:pPr/>
-              <a:t>8/28/2014</a:t>
+              <a:t>8/29/2014</a:t>
             </a:fld>
             <a:endParaRPr lang="en-US" dirty="0"/>
           </a:p>
@@ -4248,7 +4250,7 @@
             <a:fld id="{B61BEF0D-F0BB-DE4B-95CE-6DB70DBA9567}" type="datetimeFigureOut">
               <a:rPr lang="en-US" dirty="0"/>
               <a:pPr/>
-              <a:t>8/28/2014</a:t>
+              <a:t>8/29/2014</a:t>
             </a:fld>
             <a:endParaRPr lang="en-US" dirty="0"/>
           </a:p>
@@ -4371,7 +4373,7 @@
             <a:fld id="{B61BEF0D-F0BB-DE4B-95CE-6DB70DBA9567}" type="datetimeFigureOut">
               <a:rPr lang="en-US" dirty="0"/>
               <a:pPr/>
-              <a:t>8/28/2014</a:t>
+              <a:t>8/29/2014</a:t>
             </a:fld>
             <a:endParaRPr lang="en-US" dirty="0"/>
           </a:p>
@@ -4623,7 +4625,7 @@
             <a:fld id="{B61BEF0D-F0BB-DE4B-95CE-6DB70DBA9567}" type="datetimeFigureOut">
               <a:rPr lang="en-US" dirty="0"/>
               <a:pPr/>
-              <a:t>8/28/2014</a:t>
+              <a:t>8/29/2014</a:t>
             </a:fld>
             <a:endParaRPr lang="en-US" dirty="0"/>
           </a:p>
@@ -4935,7 +4937,7 @@
             <a:fld id="{B61BEF0D-F0BB-DE4B-95CE-6DB70DBA9567}" type="datetimeFigureOut">
               <a:rPr lang="en-US" dirty="0"/>
               <a:pPr/>
-              <a:t>8/28/2014</a:t>
+              <a:t>8/29/2014</a:t>
             </a:fld>
             <a:endParaRPr lang="en-US" dirty="0"/>
           </a:p>
@@ -5283,7 +5285,7 @@
             <a:fld id="{B61BEF0D-F0BB-DE4B-95CE-6DB70DBA9567}" type="datetimeFigureOut">
               <a:rPr lang="en-US" dirty="0"/>
               <a:pPr/>
-              <a:t>8/28/2014</a:t>
+              <a:t>8/29/2014</a:t>
             </a:fld>
             <a:endParaRPr lang="en-US" dirty="0"/>
           </a:p>
@@ -5949,36 +5951,6 @@
           </a:prstGeom>
         </p:spPr>
       </p:pic>
-      <p:pic>
-        <p:nvPicPr>
-          <p:cNvPr id="5" name="Picture 4"/>
-          <p:cNvPicPr>
-            <a:picLocks noChangeAspect="1"/>
-          </p:cNvPicPr>
-          <p:nvPr/>
-        </p:nvPicPr>
-        <p:blipFill>
-          <a:blip r:embed="rId3">
-            <a:extLst>
-              <a:ext uri="{28A0092B-C50C-407E-A947-70E740481C1C}">
-                <a14:useLocalDpi xmlns:a14="http://schemas.microsoft.com/office/drawing/2010/main" val="0"/>
-              </a:ext>
-            </a:extLst>
-          </a:blip>
-          <a:stretch>
-            <a:fillRect/>
-          </a:stretch>
-        </p:blipFill>
-        <p:spPr>
-          <a:xfrm>
-            <a:off x="7418716" y="-8471"/>
-            <a:ext cx="4773283" cy="2906945"/>
-          </a:xfrm>
-          <a:prstGeom prst="rect">
-            <a:avLst/>
-          </a:prstGeom>
-        </p:spPr>
-      </p:pic>
     </p:spTree>
     <p:extLst>
       <p:ext uri="{BB962C8B-B14F-4D97-AF65-F5344CB8AC3E}">
@@ -5999,7 +5971,296 @@
 </p:sld>
 </file>
 
+<file path=ppt/slides/slide10.xml><?xml version="1.0" encoding="utf-8"?>
+<p:sld xmlns:a="http://schemas.openxmlformats.org/drawingml/2006/main" xmlns:r="http://schemas.openxmlformats.org/officeDocument/2006/relationships" xmlns:p="http://schemas.openxmlformats.org/presentationml/2006/main">
+  <p:cSld>
+    <p:spTree>
+      <p:nvGrpSpPr>
+        <p:cNvPr id="1" name=""/>
+        <p:cNvGrpSpPr/>
+        <p:nvPr/>
+      </p:nvGrpSpPr>
+      <p:grpSpPr>
+        <a:xfrm>
+          <a:off x="0" y="0"/>
+          <a:ext cx="0" cy="0"/>
+          <a:chOff x="0" y="0"/>
+          <a:chExt cx="0" cy="0"/>
+        </a:xfrm>
+      </p:grpSpPr>
+      <p:sp>
+        <p:nvSpPr>
+          <p:cNvPr id="2" name="Title 1"/>
+          <p:cNvSpPr>
+            <a:spLocks noGrp="1"/>
+          </p:cNvSpPr>
+          <p:nvPr>
+            <p:ph type="title"/>
+          </p:nvPr>
+        </p:nvSpPr>
+        <p:spPr/>
+        <p:txBody>
+          <a:bodyPr/>
+          <a:lstStyle/>
+          <a:p>
+            <a:endParaRPr lang="en-SG"/>
+          </a:p>
+        </p:txBody>
+      </p:sp>
+      <p:sp>
+        <p:nvSpPr>
+          <p:cNvPr id="3" name="Content Placeholder 2"/>
+          <p:cNvSpPr>
+            <a:spLocks noGrp="1"/>
+          </p:cNvSpPr>
+          <p:nvPr>
+            <p:ph idx="1"/>
+          </p:nvPr>
+        </p:nvSpPr>
+        <p:spPr/>
+        <p:txBody>
+          <a:bodyPr/>
+          <a:lstStyle/>
+          <a:p>
+            <a:endParaRPr lang="en-SG" dirty="0"/>
+          </a:p>
+        </p:txBody>
+      </p:sp>
+      <p:pic>
+        <p:nvPicPr>
+          <p:cNvPr id="4" name="Picture 3"/>
+          <p:cNvPicPr>
+            <a:picLocks noChangeAspect="1"/>
+          </p:cNvPicPr>
+          <p:nvPr/>
+        </p:nvPicPr>
+        <p:blipFill>
+          <a:blip r:embed="rId2">
+            <a:extLst>
+              <a:ext uri="{28A0092B-C50C-407E-A947-70E740481C1C}">
+                <a14:useLocalDpi xmlns:a14="http://schemas.microsoft.com/office/drawing/2010/main" val="0"/>
+              </a:ext>
+            </a:extLst>
+          </a:blip>
+          <a:stretch>
+            <a:fillRect/>
+          </a:stretch>
+        </p:blipFill>
+        <p:spPr>
+          <a:xfrm>
+            <a:off x="3074504" y="2411412"/>
+            <a:ext cx="6109253" cy="3609975"/>
+          </a:xfrm>
+          <a:prstGeom prst="rect">
+            <a:avLst/>
+          </a:prstGeom>
+        </p:spPr>
+      </p:pic>
+    </p:spTree>
+    <p:extLst>
+      <p:ext uri="{BB962C8B-B14F-4D97-AF65-F5344CB8AC3E}">
+        <p14:creationId xmlns:p14="http://schemas.microsoft.com/office/powerpoint/2010/main" val="3706101405"/>
+      </p:ext>
+    </p:extLst>
+  </p:cSld>
+  <p:clrMapOvr>
+    <a:masterClrMapping/>
+  </p:clrMapOvr>
+  <p:timing>
+    <p:tnLst>
+      <p:par>
+        <p:cTn id="1" dur="indefinite" restart="never" nodeType="tmRoot"/>
+      </p:par>
+    </p:tnLst>
+  </p:timing>
+</p:sld>
+</file>
+
+<file path=ppt/slides/slide11.xml><?xml version="1.0" encoding="utf-8"?>
+<p:sld xmlns:a="http://schemas.openxmlformats.org/drawingml/2006/main" xmlns:r="http://schemas.openxmlformats.org/officeDocument/2006/relationships" xmlns:p="http://schemas.openxmlformats.org/presentationml/2006/main">
+  <p:cSld>
+    <p:spTree>
+      <p:nvGrpSpPr>
+        <p:cNvPr id="1" name=""/>
+        <p:cNvGrpSpPr/>
+        <p:nvPr/>
+      </p:nvGrpSpPr>
+      <p:grpSpPr>
+        <a:xfrm>
+          <a:off x="0" y="0"/>
+          <a:ext cx="0" cy="0"/>
+          <a:chOff x="0" y="0"/>
+          <a:chExt cx="0" cy="0"/>
+        </a:xfrm>
+      </p:grpSpPr>
+      <p:sp>
+        <p:nvSpPr>
+          <p:cNvPr id="4" name="Title 3"/>
+          <p:cNvSpPr>
+            <a:spLocks noGrp="1"/>
+          </p:cNvSpPr>
+          <p:nvPr>
+            <p:ph type="ctrTitle"/>
+          </p:nvPr>
+        </p:nvSpPr>
+        <p:spPr/>
+        <p:txBody>
+          <a:bodyPr/>
+          <a:lstStyle/>
+          <a:p>
+            <a:r>
+              <a:rPr lang="en-SG" dirty="0" smtClean="0"/>
+              <a:t>Thank You!!</a:t>
+            </a:r>
+            <a:endParaRPr lang="en-SG" dirty="0"/>
+          </a:p>
+        </p:txBody>
+      </p:sp>
+      <p:sp>
+        <p:nvSpPr>
+          <p:cNvPr id="5" name="Subtitle 4"/>
+          <p:cNvSpPr>
+            <a:spLocks noGrp="1"/>
+          </p:cNvSpPr>
+          <p:nvPr>
+            <p:ph type="subTitle" idx="1"/>
+          </p:nvPr>
+        </p:nvSpPr>
+        <p:spPr/>
+        <p:txBody>
+          <a:bodyPr/>
+          <a:lstStyle/>
+          <a:p>
+            <a:endParaRPr lang="en-SG" dirty="0"/>
+          </a:p>
+        </p:txBody>
+      </p:sp>
+    </p:spTree>
+    <p:extLst>
+      <p:ext uri="{BB962C8B-B14F-4D97-AF65-F5344CB8AC3E}">
+        <p14:creationId xmlns:p14="http://schemas.microsoft.com/office/powerpoint/2010/main" val="4219091193"/>
+      </p:ext>
+    </p:extLst>
+  </p:cSld>
+  <p:clrMapOvr>
+    <a:masterClrMapping/>
+  </p:clrMapOvr>
+  <p:timing>
+    <p:tnLst>
+      <p:par>
+        <p:cTn id="1" dur="indefinite" restart="never" nodeType="tmRoot"/>
+      </p:par>
+    </p:tnLst>
+  </p:timing>
+</p:sld>
+</file>
+
 <file path=ppt/slides/slide2.xml><?xml version="1.0" encoding="utf-8"?>
+<p:sld xmlns:a="http://schemas.openxmlformats.org/drawingml/2006/main" xmlns:r="http://schemas.openxmlformats.org/officeDocument/2006/relationships" xmlns:p="http://schemas.openxmlformats.org/presentationml/2006/main">
+  <p:cSld>
+    <p:spTree>
+      <p:nvGrpSpPr>
+        <p:cNvPr id="1" name=""/>
+        <p:cNvGrpSpPr/>
+        <p:nvPr/>
+      </p:nvGrpSpPr>
+      <p:grpSpPr>
+        <a:xfrm>
+          <a:off x="0" y="0"/>
+          <a:ext cx="0" cy="0"/>
+          <a:chOff x="0" y="0"/>
+          <a:chExt cx="0" cy="0"/>
+        </a:xfrm>
+      </p:grpSpPr>
+      <p:sp>
+        <p:nvSpPr>
+          <p:cNvPr id="2" name="Title 1"/>
+          <p:cNvSpPr>
+            <a:spLocks noGrp="1"/>
+          </p:cNvSpPr>
+          <p:nvPr>
+            <p:ph type="title"/>
+          </p:nvPr>
+        </p:nvSpPr>
+        <p:spPr/>
+        <p:txBody>
+          <a:bodyPr/>
+          <a:lstStyle/>
+          <a:p>
+            <a:endParaRPr lang="en-SG"/>
+          </a:p>
+        </p:txBody>
+      </p:sp>
+      <p:sp>
+        <p:nvSpPr>
+          <p:cNvPr id="3" name="Content Placeholder 2"/>
+          <p:cNvSpPr>
+            <a:spLocks noGrp="1"/>
+          </p:cNvSpPr>
+          <p:nvPr>
+            <p:ph idx="1"/>
+          </p:nvPr>
+        </p:nvSpPr>
+        <p:spPr/>
+        <p:txBody>
+          <a:bodyPr/>
+          <a:lstStyle/>
+          <a:p>
+            <a:endParaRPr lang="en-SG"/>
+          </a:p>
+        </p:txBody>
+      </p:sp>
+      <p:pic>
+        <p:nvPicPr>
+          <p:cNvPr id="4" name="Picture 3"/>
+          <p:cNvPicPr>
+            <a:picLocks noChangeAspect="1"/>
+          </p:cNvPicPr>
+          <p:nvPr/>
+        </p:nvPicPr>
+        <p:blipFill>
+          <a:blip r:embed="rId2">
+            <a:extLst>
+              <a:ext uri="{28A0092B-C50C-407E-A947-70E740481C1C}">
+                <a14:useLocalDpi xmlns:a14="http://schemas.microsoft.com/office/drawing/2010/main" val="0"/>
+              </a:ext>
+            </a:extLst>
+          </a:blip>
+          <a:stretch>
+            <a:fillRect/>
+          </a:stretch>
+        </p:blipFill>
+        <p:spPr>
+          <a:xfrm>
+            <a:off x="2716697" y="2272747"/>
+            <a:ext cx="6917634" cy="3589869"/>
+          </a:xfrm>
+          <a:prstGeom prst="rect">
+            <a:avLst/>
+          </a:prstGeom>
+        </p:spPr>
+      </p:pic>
+    </p:spTree>
+    <p:extLst>
+      <p:ext uri="{BB962C8B-B14F-4D97-AF65-F5344CB8AC3E}">
+        <p14:creationId xmlns:p14="http://schemas.microsoft.com/office/powerpoint/2010/main" val="110373185"/>
+      </p:ext>
+    </p:extLst>
+  </p:cSld>
+  <p:clrMapOvr>
+    <a:masterClrMapping/>
+  </p:clrMapOvr>
+  <p:timing>
+    <p:tnLst>
+      <p:par>
+        <p:cTn id="1" dur="indefinite" restart="never" nodeType="tmRoot"/>
+      </p:par>
+    </p:tnLst>
+  </p:timing>
+</p:sld>
+</file>
+
+<file path=ppt/slides/slide3.xml><?xml version="1.0" encoding="utf-8"?>
 <p:sld xmlns:a="http://schemas.openxmlformats.org/drawingml/2006/main" xmlns:r="http://schemas.openxmlformats.org/officeDocument/2006/relationships" xmlns:p="http://schemas.openxmlformats.org/presentationml/2006/main">
   <p:cSld>
     <p:spTree>
@@ -6142,7 +6403,7 @@
 </p:sld>
 </file>
 
-<file path=ppt/slides/slide3.xml><?xml version="1.0" encoding="utf-8"?>
+<file path=ppt/slides/slide4.xml><?xml version="1.0" encoding="utf-8"?>
 <p:sld xmlns:a="http://schemas.openxmlformats.org/drawingml/2006/main" xmlns:r="http://schemas.openxmlformats.org/officeDocument/2006/relationships" xmlns:p="http://schemas.openxmlformats.org/presentationml/2006/main">
   <p:cSld>
     <p:spTree>
@@ -6221,7 +6482,7 @@
 </p:sld>
 </file>
 
-<file path=ppt/slides/slide4.xml><?xml version="1.0" encoding="utf-8"?>
+<file path=ppt/slides/slide5.xml><?xml version="1.0" encoding="utf-8"?>
 <p:sld xmlns:a="http://schemas.openxmlformats.org/drawingml/2006/main" xmlns:r="http://schemas.openxmlformats.org/officeDocument/2006/relationships" xmlns:p="http://schemas.openxmlformats.org/presentationml/2006/main">
   <p:cSld>
     <p:spTree>
@@ -6395,7 +6656,7 @@
 </p:sld>
 </file>
 
-<file path=ppt/slides/slide5.xml><?xml version="1.0" encoding="utf-8"?>
+<file path=ppt/slides/slide6.xml><?xml version="1.0" encoding="utf-8"?>
 <p:sld xmlns:a="http://schemas.openxmlformats.org/drawingml/2006/main" xmlns:r="http://schemas.openxmlformats.org/officeDocument/2006/relationships" xmlns:p="http://schemas.openxmlformats.org/presentationml/2006/main">
   <p:cSld>
     <p:spTree>
@@ -6478,7 +6739,7 @@
 </p:sld>
 </file>
 
-<file path=ppt/slides/slide6.xml><?xml version="1.0" encoding="utf-8"?>
+<file path=ppt/slides/slide7.xml><?xml version="1.0" encoding="utf-8"?>
 <p:sld xmlns:a="http://schemas.openxmlformats.org/drawingml/2006/main" xmlns:r="http://schemas.openxmlformats.org/officeDocument/2006/relationships" xmlns:p="http://schemas.openxmlformats.org/presentationml/2006/main">
   <p:cSld>
     <p:spTree>
@@ -6591,7 +6852,7 @@
 </p:sld>
 </file>
 
-<file path=ppt/slides/slide7.xml><?xml version="1.0" encoding="utf-8"?>
+<file path=ppt/slides/slide8.xml><?xml version="1.0" encoding="utf-8"?>
 <p:sld xmlns:a="http://schemas.openxmlformats.org/drawingml/2006/main" xmlns:r="http://schemas.openxmlformats.org/officeDocument/2006/relationships" xmlns:p="http://schemas.openxmlformats.org/presentationml/2006/main">
   <p:cSld>
     <p:spTree>
@@ -6740,7 +7001,7 @@
 </p:sld>
 </file>
 
-<file path=ppt/slides/slide8.xml><?xml version="1.0" encoding="utf-8"?>
+<file path=ppt/slides/slide9.xml><?xml version="1.0" encoding="utf-8"?>
 <p:sld xmlns:a="http://schemas.openxmlformats.org/drawingml/2006/main" xmlns:r="http://schemas.openxmlformats.org/officeDocument/2006/relationships" xmlns:p="http://schemas.openxmlformats.org/presentationml/2006/main">
   <p:cSld>
     <p:spTree>
@@ -6836,115 +7097,6 @@
     <p:extLst>
       <p:ext uri="{BB962C8B-B14F-4D97-AF65-F5344CB8AC3E}">
         <p14:creationId xmlns:p14="http://schemas.microsoft.com/office/powerpoint/2010/main" val="3064043885"/>
-      </p:ext>
-    </p:extLst>
-  </p:cSld>
-  <p:clrMapOvr>
-    <a:masterClrMapping/>
-  </p:clrMapOvr>
-  <p:timing>
-    <p:tnLst>
-      <p:par>
-        <p:cTn id="1" dur="indefinite" restart="never" nodeType="tmRoot"/>
-      </p:par>
-    </p:tnLst>
-  </p:timing>
-</p:sld>
-</file>
-
-<file path=ppt/slides/slide9.xml><?xml version="1.0" encoding="utf-8"?>
-<p:sld xmlns:a="http://schemas.openxmlformats.org/drawingml/2006/main" xmlns:r="http://schemas.openxmlformats.org/officeDocument/2006/relationships" xmlns:p="http://schemas.openxmlformats.org/presentationml/2006/main">
-  <p:cSld>
-    <p:spTree>
-      <p:nvGrpSpPr>
-        <p:cNvPr id="1" name=""/>
-        <p:cNvGrpSpPr/>
-        <p:nvPr/>
-      </p:nvGrpSpPr>
-      <p:grpSpPr>
-        <a:xfrm>
-          <a:off x="0" y="0"/>
-          <a:ext cx="0" cy="0"/>
-          <a:chOff x="0" y="0"/>
-          <a:chExt cx="0" cy="0"/>
-        </a:xfrm>
-      </p:grpSpPr>
-      <p:sp>
-        <p:nvSpPr>
-          <p:cNvPr id="4" name="Title 3"/>
-          <p:cNvSpPr>
-            <a:spLocks noGrp="1"/>
-          </p:cNvSpPr>
-          <p:nvPr>
-            <p:ph type="ctrTitle"/>
-          </p:nvPr>
-        </p:nvSpPr>
-        <p:spPr/>
-        <p:txBody>
-          <a:bodyPr/>
-          <a:lstStyle/>
-          <a:p>
-            <a:r>
-              <a:rPr lang="en-SG" dirty="0" smtClean="0"/>
-              <a:t>Thank You!!</a:t>
-            </a:r>
-            <a:endParaRPr lang="en-SG" dirty="0"/>
-          </a:p>
-        </p:txBody>
-      </p:sp>
-      <p:sp>
-        <p:nvSpPr>
-          <p:cNvPr id="5" name="Subtitle 4"/>
-          <p:cNvSpPr>
-            <a:spLocks noGrp="1"/>
-          </p:cNvSpPr>
-          <p:nvPr>
-            <p:ph type="subTitle" idx="1"/>
-          </p:nvPr>
-        </p:nvSpPr>
-        <p:spPr/>
-        <p:txBody>
-          <a:bodyPr/>
-          <a:lstStyle/>
-          <a:p>
-            <a:endParaRPr lang="en-SG" dirty="0"/>
-          </a:p>
-        </p:txBody>
-      </p:sp>
-      <p:pic>
-        <p:nvPicPr>
-          <p:cNvPr id="2" name="Picture 1"/>
-          <p:cNvPicPr>
-            <a:picLocks noChangeAspect="1"/>
-          </p:cNvPicPr>
-          <p:nvPr/>
-        </p:nvPicPr>
-        <p:blipFill>
-          <a:blip r:embed="rId2">
-            <a:extLst>
-              <a:ext uri="{28A0092B-C50C-407E-A947-70E740481C1C}">
-                <a14:useLocalDpi xmlns:a14="http://schemas.microsoft.com/office/drawing/2010/main" val="0"/>
-              </a:ext>
-            </a:extLst>
-          </a:blip>
-          <a:stretch>
-            <a:fillRect/>
-          </a:stretch>
-        </p:blipFill>
-        <p:spPr>
-          <a:xfrm>
-            <a:off x="3699932" y="3248025"/>
-            <a:ext cx="4800600" cy="3609975"/>
-          </a:xfrm>
-          <a:prstGeom prst="rect">
-            <a:avLst/>
-          </a:prstGeom>
-        </p:spPr>
-      </p:pic>
-    </p:spTree>
-    <p:extLst>
-      <p:ext uri="{BB962C8B-B14F-4D97-AF65-F5344CB8AC3E}">
-        <p14:creationId xmlns:p14="http://schemas.microsoft.com/office/powerpoint/2010/main" val="4219091193"/>
       </p:ext>
     </p:extLst>
   </p:cSld>

</xml_diff>

<commit_message>
Updated version from Wei Heng cao Thursday 28082014
</commit_message>
<xml_diff>
--- a/Laser Cat (concept paper).pptx
+++ b/Laser Cat (concept paper).pptx
@@ -6,16 +6,17 @@
   </p:sldMasterIdLst>
   <p:sldIdLst>
     <p:sldId id="256" r:id="rId2"/>
-    <p:sldId id="265" r:id="rId3"/>
-    <p:sldId id="257" r:id="rId4"/>
-    <p:sldId id="258" r:id="rId5"/>
-    <p:sldId id="259" r:id="rId6"/>
-    <p:sldId id="260" r:id="rId7"/>
-    <p:sldId id="261" r:id="rId8"/>
-    <p:sldId id="262" r:id="rId9"/>
-    <p:sldId id="263" r:id="rId10"/>
-    <p:sldId id="266" r:id="rId11"/>
-    <p:sldId id="264" r:id="rId12"/>
+    <p:sldId id="267" r:id="rId3"/>
+    <p:sldId id="265" r:id="rId4"/>
+    <p:sldId id="257" r:id="rId5"/>
+    <p:sldId id="258" r:id="rId6"/>
+    <p:sldId id="259" r:id="rId7"/>
+    <p:sldId id="260" r:id="rId8"/>
+    <p:sldId id="261" r:id="rId9"/>
+    <p:sldId id="262" r:id="rId10"/>
+    <p:sldId id="263" r:id="rId11"/>
+    <p:sldId id="266" r:id="rId12"/>
+    <p:sldId id="264" r:id="rId13"/>
   </p:sldIdLst>
   <p:sldSz cx="12192000" cy="6858000"/>
   <p:notesSz cx="6858000" cy="9144000"/>
@@ -6003,6 +6004,118 @@
           <a:bodyPr/>
           <a:lstStyle/>
           <a:p>
+            <a:r>
+              <a:rPr lang="en-SG" dirty="0" smtClean="0"/>
+              <a:t>Inspirations</a:t>
+            </a:r>
+            <a:endParaRPr lang="en-SG" dirty="0"/>
+          </a:p>
+        </p:txBody>
+      </p:sp>
+      <p:sp>
+        <p:nvSpPr>
+          <p:cNvPr id="3" name="Content Placeholder 2"/>
+          <p:cNvSpPr>
+            <a:spLocks noGrp="1"/>
+          </p:cNvSpPr>
+          <p:nvPr>
+            <p:ph idx="1"/>
+          </p:nvPr>
+        </p:nvSpPr>
+        <p:spPr/>
+        <p:txBody>
+          <a:bodyPr/>
+          <a:lstStyle/>
+          <a:p>
+            <a:pPr marL="0" indent="0">
+              <a:buNone/>
+            </a:pPr>
+            <a:endParaRPr lang="en-SG" dirty="0"/>
+          </a:p>
+        </p:txBody>
+      </p:sp>
+      <p:pic>
+        <p:nvPicPr>
+          <p:cNvPr id="4" name="Picture 3"/>
+          <p:cNvPicPr>
+            <a:picLocks noChangeAspect="1"/>
+          </p:cNvPicPr>
+          <p:nvPr/>
+        </p:nvPicPr>
+        <p:blipFill>
+          <a:blip r:embed="rId2">
+            <a:extLst>
+              <a:ext uri="{28A0092B-C50C-407E-A947-70E740481C1C}">
+                <a14:useLocalDpi xmlns:a14="http://schemas.microsoft.com/office/drawing/2010/main" val="0"/>
+              </a:ext>
+            </a:extLst>
+          </a:blip>
+          <a:stretch>
+            <a:fillRect/>
+          </a:stretch>
+        </p:blipFill>
+        <p:spPr>
+          <a:xfrm>
+            <a:off x="1295401" y="2285999"/>
+            <a:ext cx="4286250" cy="3969027"/>
+          </a:xfrm>
+          <a:prstGeom prst="rect">
+            <a:avLst/>
+          </a:prstGeom>
+        </p:spPr>
+      </p:pic>
+    </p:spTree>
+    <p:extLst>
+      <p:ext uri="{BB962C8B-B14F-4D97-AF65-F5344CB8AC3E}">
+        <p14:creationId xmlns:p14="http://schemas.microsoft.com/office/powerpoint/2010/main" val="3064043885"/>
+      </p:ext>
+    </p:extLst>
+  </p:cSld>
+  <p:clrMapOvr>
+    <a:masterClrMapping/>
+  </p:clrMapOvr>
+  <p:timing>
+    <p:tnLst>
+      <p:par>
+        <p:cTn id="1" dur="indefinite" restart="never" nodeType="tmRoot"/>
+      </p:par>
+    </p:tnLst>
+  </p:timing>
+</p:sld>
+</file>
+
+<file path=ppt/slides/slide11.xml><?xml version="1.0" encoding="utf-8"?>
+<p:sld xmlns:a="http://schemas.openxmlformats.org/drawingml/2006/main" xmlns:r="http://schemas.openxmlformats.org/officeDocument/2006/relationships" xmlns:p="http://schemas.openxmlformats.org/presentationml/2006/main">
+  <p:cSld>
+    <p:spTree>
+      <p:nvGrpSpPr>
+        <p:cNvPr id="1" name=""/>
+        <p:cNvGrpSpPr/>
+        <p:nvPr/>
+      </p:nvGrpSpPr>
+      <p:grpSpPr>
+        <a:xfrm>
+          <a:off x="0" y="0"/>
+          <a:ext cx="0" cy="0"/>
+          <a:chOff x="0" y="0"/>
+          <a:chExt cx="0" cy="0"/>
+        </a:xfrm>
+      </p:grpSpPr>
+      <p:sp>
+        <p:nvSpPr>
+          <p:cNvPr id="2" name="Title 1"/>
+          <p:cNvSpPr>
+            <a:spLocks noGrp="1"/>
+          </p:cNvSpPr>
+          <p:nvPr>
+            <p:ph type="title"/>
+          </p:nvPr>
+        </p:nvSpPr>
+        <p:spPr/>
+        <p:txBody>
+          <a:bodyPr/>
+          <a:lstStyle/>
+          <a:p>
             <a:endParaRPr lang="en-SG"/>
           </a:p>
         </p:txBody>
@@ -6076,7 +6189,7 @@
 </p:sld>
 </file>
 
-<file path=ppt/slides/slide11.xml><?xml version="1.0" encoding="utf-8"?>
+<file path=ppt/slides/slide12.xml><?xml version="1.0" encoding="utf-8"?>
 <p:sld xmlns:a="http://schemas.openxmlformats.org/drawingml/2006/main" xmlns:r="http://schemas.openxmlformats.org/officeDocument/2006/relationships" xmlns:p="http://schemas.openxmlformats.org/presentationml/2006/main">
   <p:cSld>
     <p:spTree>
@@ -6156,6 +6269,82 @@
 </file>
 
 <file path=ppt/slides/slide2.xml><?xml version="1.0" encoding="utf-8"?>
+<p:sld xmlns:a="http://schemas.openxmlformats.org/drawingml/2006/main" xmlns:r="http://schemas.openxmlformats.org/officeDocument/2006/relationships" xmlns:p="http://schemas.openxmlformats.org/presentationml/2006/main">
+  <p:cSld>
+    <p:spTree>
+      <p:nvGrpSpPr>
+        <p:cNvPr id="1" name=""/>
+        <p:cNvGrpSpPr/>
+        <p:nvPr/>
+      </p:nvGrpSpPr>
+      <p:grpSpPr>
+        <a:xfrm>
+          <a:off x="0" y="0"/>
+          <a:ext cx="0" cy="0"/>
+          <a:chOff x="0" y="0"/>
+          <a:chExt cx="0" cy="0"/>
+        </a:xfrm>
+      </p:grpSpPr>
+      <p:sp>
+        <p:nvSpPr>
+          <p:cNvPr id="2" name="Title 1"/>
+          <p:cNvSpPr>
+            <a:spLocks noGrp="1"/>
+          </p:cNvSpPr>
+          <p:nvPr>
+            <p:ph type="title"/>
+          </p:nvPr>
+        </p:nvSpPr>
+        <p:spPr/>
+        <p:txBody>
+          <a:bodyPr/>
+          <a:lstStyle/>
+          <a:p>
+            <a:r>
+              <a:rPr lang="en-SG" dirty="0" smtClean="0"/>
+              <a:t>Disclaimer</a:t>
+            </a:r>
+            <a:endParaRPr lang="en-SG" dirty="0"/>
+          </a:p>
+        </p:txBody>
+      </p:sp>
+      <p:sp>
+        <p:nvSpPr>
+          <p:cNvPr id="3" name="Content Placeholder 2"/>
+          <p:cNvSpPr>
+            <a:spLocks noGrp="1"/>
+          </p:cNvSpPr>
+          <p:nvPr>
+            <p:ph idx="1"/>
+          </p:nvPr>
+        </p:nvSpPr>
+        <p:spPr/>
+        <p:txBody>
+          <a:bodyPr/>
+          <a:lstStyle/>
+          <a:p>
+            <a:r>
+              <a:rPr lang="en-SG" dirty="0" smtClean="0"/>
+              <a:t>Please note that the pictures provided in this presentation do not intend to infringe any copyright. Credits are given to the sources.</a:t>
+            </a:r>
+            <a:endParaRPr lang="en-SG" dirty="0"/>
+          </a:p>
+        </p:txBody>
+      </p:sp>
+    </p:spTree>
+    <p:extLst>
+      <p:ext uri="{BB962C8B-B14F-4D97-AF65-F5344CB8AC3E}">
+        <p14:creationId xmlns:p14="http://schemas.microsoft.com/office/powerpoint/2010/main" val="1155282881"/>
+      </p:ext>
+    </p:extLst>
+  </p:cSld>
+  <p:clrMapOvr>
+    <a:masterClrMapping/>
+  </p:clrMapOvr>
+</p:sld>
+</file>
+
+<file path=ppt/slides/slide3.xml><?xml version="1.0" encoding="utf-8"?>
 <p:sld xmlns:a="http://schemas.openxmlformats.org/drawingml/2006/main" xmlns:r="http://schemas.openxmlformats.org/officeDocument/2006/relationships" xmlns:p="http://schemas.openxmlformats.org/presentationml/2006/main">
   <p:cSld>
     <p:spTree>
@@ -6260,7 +6449,7 @@
 </p:sld>
 </file>
 
-<file path=ppt/slides/slide3.xml><?xml version="1.0" encoding="utf-8"?>
+<file path=ppt/slides/slide4.xml><?xml version="1.0" encoding="utf-8"?>
 <p:sld xmlns:a="http://schemas.openxmlformats.org/drawingml/2006/main" xmlns:r="http://schemas.openxmlformats.org/officeDocument/2006/relationships" xmlns:p="http://schemas.openxmlformats.org/presentationml/2006/main">
   <p:cSld>
     <p:spTree>
@@ -6403,7 +6592,7 @@
 </p:sld>
 </file>
 
-<file path=ppt/slides/slide4.xml><?xml version="1.0" encoding="utf-8"?>
+<file path=ppt/slides/slide5.xml><?xml version="1.0" encoding="utf-8"?>
 <p:sld xmlns:a="http://schemas.openxmlformats.org/drawingml/2006/main" xmlns:r="http://schemas.openxmlformats.org/officeDocument/2006/relationships" xmlns:p="http://schemas.openxmlformats.org/presentationml/2006/main">
   <p:cSld>
     <p:spTree>
@@ -6482,7 +6671,7 @@
 </p:sld>
 </file>
 
-<file path=ppt/slides/slide5.xml><?xml version="1.0" encoding="utf-8"?>
+<file path=ppt/slides/slide6.xml><?xml version="1.0" encoding="utf-8"?>
 <p:sld xmlns:a="http://schemas.openxmlformats.org/drawingml/2006/main" xmlns:r="http://schemas.openxmlformats.org/officeDocument/2006/relationships" xmlns:p="http://schemas.openxmlformats.org/presentationml/2006/main">
   <p:cSld>
     <p:spTree>
@@ -6656,7 +6845,7 @@
 </p:sld>
 </file>
 
-<file path=ppt/slides/slide6.xml><?xml version="1.0" encoding="utf-8"?>
+<file path=ppt/slides/slide7.xml><?xml version="1.0" encoding="utf-8"?>
 <p:sld xmlns:a="http://schemas.openxmlformats.org/drawingml/2006/main" xmlns:r="http://schemas.openxmlformats.org/officeDocument/2006/relationships" xmlns:p="http://schemas.openxmlformats.org/presentationml/2006/main">
   <p:cSld>
     <p:spTree>
@@ -6739,7 +6928,7 @@
 </p:sld>
 </file>
 
-<file path=ppt/slides/slide7.xml><?xml version="1.0" encoding="utf-8"?>
+<file path=ppt/slides/slide8.xml><?xml version="1.0" encoding="utf-8"?>
 <p:sld xmlns:a="http://schemas.openxmlformats.org/drawingml/2006/main" xmlns:r="http://schemas.openxmlformats.org/officeDocument/2006/relationships" xmlns:p="http://schemas.openxmlformats.org/presentationml/2006/main">
   <p:cSld>
     <p:spTree>
@@ -6852,7 +7041,7 @@
 </p:sld>
 </file>
 
-<file path=ppt/slides/slide8.xml><?xml version="1.0" encoding="utf-8"?>
+<file path=ppt/slides/slide9.xml><?xml version="1.0" encoding="utf-8"?>
 <p:sld xmlns:a="http://schemas.openxmlformats.org/drawingml/2006/main" xmlns:r="http://schemas.openxmlformats.org/officeDocument/2006/relationships" xmlns:p="http://schemas.openxmlformats.org/presentationml/2006/main">
   <p:cSld>
     <p:spTree>
@@ -6985,118 +7174,6 @@
     <p:extLst>
       <p:ext uri="{BB962C8B-B14F-4D97-AF65-F5344CB8AC3E}">
         <p14:creationId xmlns:p14="http://schemas.microsoft.com/office/powerpoint/2010/main" val="2584604006"/>
-      </p:ext>
-    </p:extLst>
-  </p:cSld>
-  <p:clrMapOvr>
-    <a:masterClrMapping/>
-  </p:clrMapOvr>
-  <p:timing>
-    <p:tnLst>
-      <p:par>
-        <p:cTn id="1" dur="indefinite" restart="never" nodeType="tmRoot"/>
-      </p:par>
-    </p:tnLst>
-  </p:timing>
-</p:sld>
-</file>
-
-<file path=ppt/slides/slide9.xml><?xml version="1.0" encoding="utf-8"?>
-<p:sld xmlns:a="http://schemas.openxmlformats.org/drawingml/2006/main" xmlns:r="http://schemas.openxmlformats.org/officeDocument/2006/relationships" xmlns:p="http://schemas.openxmlformats.org/presentationml/2006/main">
-  <p:cSld>
-    <p:spTree>
-      <p:nvGrpSpPr>
-        <p:cNvPr id="1" name=""/>
-        <p:cNvGrpSpPr/>
-        <p:nvPr/>
-      </p:nvGrpSpPr>
-      <p:grpSpPr>
-        <a:xfrm>
-          <a:off x="0" y="0"/>
-          <a:ext cx="0" cy="0"/>
-          <a:chOff x="0" y="0"/>
-          <a:chExt cx="0" cy="0"/>
-        </a:xfrm>
-      </p:grpSpPr>
-      <p:sp>
-        <p:nvSpPr>
-          <p:cNvPr id="2" name="Title 1"/>
-          <p:cNvSpPr>
-            <a:spLocks noGrp="1"/>
-          </p:cNvSpPr>
-          <p:nvPr>
-            <p:ph type="title"/>
-          </p:nvPr>
-        </p:nvSpPr>
-        <p:spPr/>
-        <p:txBody>
-          <a:bodyPr/>
-          <a:lstStyle/>
-          <a:p>
-            <a:r>
-              <a:rPr lang="en-SG" dirty="0" smtClean="0"/>
-              <a:t>Inspirations</a:t>
-            </a:r>
-            <a:endParaRPr lang="en-SG" dirty="0"/>
-          </a:p>
-        </p:txBody>
-      </p:sp>
-      <p:sp>
-        <p:nvSpPr>
-          <p:cNvPr id="3" name="Content Placeholder 2"/>
-          <p:cNvSpPr>
-            <a:spLocks noGrp="1"/>
-          </p:cNvSpPr>
-          <p:nvPr>
-            <p:ph idx="1"/>
-          </p:nvPr>
-        </p:nvSpPr>
-        <p:spPr/>
-        <p:txBody>
-          <a:bodyPr/>
-          <a:lstStyle/>
-          <a:p>
-            <a:pPr marL="0" indent="0">
-              <a:buNone/>
-            </a:pPr>
-            <a:endParaRPr lang="en-SG" dirty="0"/>
-          </a:p>
-        </p:txBody>
-      </p:sp>
-      <p:pic>
-        <p:nvPicPr>
-          <p:cNvPr id="4" name="Picture 3"/>
-          <p:cNvPicPr>
-            <a:picLocks noChangeAspect="1"/>
-          </p:cNvPicPr>
-          <p:nvPr/>
-        </p:nvPicPr>
-        <p:blipFill>
-          <a:blip r:embed="rId2">
-            <a:extLst>
-              <a:ext uri="{28A0092B-C50C-407E-A947-70E740481C1C}">
-                <a14:useLocalDpi xmlns:a14="http://schemas.microsoft.com/office/drawing/2010/main" val="0"/>
-              </a:ext>
-            </a:extLst>
-          </a:blip>
-          <a:stretch>
-            <a:fillRect/>
-          </a:stretch>
-        </p:blipFill>
-        <p:spPr>
-          <a:xfrm>
-            <a:off x="1295401" y="2285999"/>
-            <a:ext cx="4286250" cy="3969027"/>
-          </a:xfrm>
-          <a:prstGeom prst="rect">
-            <a:avLst/>
-          </a:prstGeom>
-        </p:spPr>
-      </p:pic>
-    </p:spTree>
-    <p:extLst>
-      <p:ext uri="{BB962C8B-B14F-4D97-AF65-F5344CB8AC3E}">
-        <p14:creationId xmlns:p14="http://schemas.microsoft.com/office/powerpoint/2010/main" val="3064043885"/>
       </p:ext>
     </p:extLst>
   </p:cSld>

</xml_diff>

<commit_message>
Changes made cao 010914
</commit_message>
<xml_diff>
--- a/Laser Cat (concept paper).pptx
+++ b/Laser Cat (concept paper).pptx
@@ -9,14 +9,18 @@
     <p:sldId id="267" r:id="rId3"/>
     <p:sldId id="265" r:id="rId4"/>
     <p:sldId id="257" r:id="rId5"/>
-    <p:sldId id="258" r:id="rId6"/>
-    <p:sldId id="259" r:id="rId7"/>
-    <p:sldId id="260" r:id="rId8"/>
-    <p:sldId id="261" r:id="rId9"/>
-    <p:sldId id="262" r:id="rId10"/>
-    <p:sldId id="263" r:id="rId11"/>
-    <p:sldId id="266" r:id="rId12"/>
-    <p:sldId id="264" r:id="rId13"/>
+    <p:sldId id="268" r:id="rId6"/>
+    <p:sldId id="270" r:id="rId7"/>
+    <p:sldId id="271" r:id="rId8"/>
+    <p:sldId id="269" r:id="rId9"/>
+    <p:sldId id="258" r:id="rId10"/>
+    <p:sldId id="259" r:id="rId11"/>
+    <p:sldId id="260" r:id="rId12"/>
+    <p:sldId id="261" r:id="rId13"/>
+    <p:sldId id="262" r:id="rId14"/>
+    <p:sldId id="263" r:id="rId15"/>
+    <p:sldId id="266" r:id="rId16"/>
+    <p:sldId id="264" r:id="rId17"/>
   </p:sldIdLst>
   <p:sldSz cx="12192000" cy="6858000"/>
   <p:notesSz cx="6858000" cy="9144000"/>
@@ -455,7 +459,7 @@
             <a:fld id="{B61BEF0D-F0BB-DE4B-95CE-6DB70DBA9567}" type="datetimeFigureOut">
               <a:rPr lang="en-US" dirty="0"/>
               <a:pPr/>
-              <a:t>8/29/2014</a:t>
+              <a:t>9/1/2014</a:t>
             </a:fld>
             <a:endParaRPr lang="en-US" dirty="0"/>
           </a:p>
@@ -776,7 +780,7 @@
             <a:fld id="{B61BEF0D-F0BB-DE4B-95CE-6DB70DBA9567}" type="datetimeFigureOut">
               <a:rPr lang="en-US" dirty="0"/>
               <a:pPr/>
-              <a:t>8/29/2014</a:t>
+              <a:t>9/1/2014</a:t>
             </a:fld>
             <a:endParaRPr lang="en-US" dirty="0"/>
           </a:p>
@@ -1021,7 +1025,7 @@
             <a:fld id="{B61BEF0D-F0BB-DE4B-95CE-6DB70DBA9567}" type="datetimeFigureOut">
               <a:rPr lang="en-US" dirty="0"/>
               <a:pPr/>
-              <a:t>8/29/2014</a:t>
+              <a:t>9/1/2014</a:t>
             </a:fld>
             <a:endParaRPr lang="en-US" dirty="0"/>
           </a:p>
@@ -1357,7 +1361,7 @@
             <a:fld id="{B61BEF0D-F0BB-DE4B-95CE-6DB70DBA9567}" type="datetimeFigureOut">
               <a:rPr lang="en-US" dirty="0"/>
               <a:pPr/>
-              <a:t>8/29/2014</a:t>
+              <a:t>9/1/2014</a:t>
             </a:fld>
             <a:endParaRPr lang="en-US" dirty="0"/>
           </a:p>
@@ -1701,7 +1705,7 @@
             <a:fld id="{B61BEF0D-F0BB-DE4B-95CE-6DB70DBA9567}" type="datetimeFigureOut">
               <a:rPr lang="en-US" dirty="0"/>
               <a:pPr/>
-              <a:t>8/29/2014</a:t>
+              <a:t>9/1/2014</a:t>
             </a:fld>
             <a:endParaRPr lang="en-US" dirty="0"/>
           </a:p>
@@ -2072,7 +2076,7 @@
             <a:fld id="{B61BEF0D-F0BB-DE4B-95CE-6DB70DBA9567}" type="datetimeFigureOut">
               <a:rPr lang="en-US" dirty="0"/>
               <a:pPr/>
-              <a:t>8/29/2014</a:t>
+              <a:t>9/1/2014</a:t>
             </a:fld>
             <a:endParaRPr lang="en-US" dirty="0"/>
           </a:p>
@@ -2539,7 +2543,7 @@
             <a:fld id="{B61BEF0D-F0BB-DE4B-95CE-6DB70DBA9567}" type="datetimeFigureOut">
               <a:rPr lang="en-US" dirty="0"/>
               <a:pPr/>
-              <a:t>8/29/2014</a:t>
+              <a:t>9/1/2014</a:t>
             </a:fld>
             <a:endParaRPr lang="en-US" dirty="0"/>
           </a:p>
@@ -2741,7 +2745,7 @@
             <a:fld id="{B61BEF0D-F0BB-DE4B-95CE-6DB70DBA9567}" type="datetimeFigureOut">
               <a:rPr lang="en-US" dirty="0"/>
               <a:pPr/>
-              <a:t>8/29/2014</a:t>
+              <a:t>9/1/2014</a:t>
             </a:fld>
             <a:endParaRPr lang="en-US" dirty="0"/>
           </a:p>
@@ -2949,7 +2953,7 @@
             <a:fld id="{B61BEF0D-F0BB-DE4B-95CE-6DB70DBA9567}" type="datetimeFigureOut">
               <a:rPr lang="en-US" dirty="0"/>
               <a:pPr/>
-              <a:t>8/29/2014</a:t>
+              <a:t>9/1/2014</a:t>
             </a:fld>
             <a:endParaRPr lang="en-US" dirty="0"/>
           </a:p>
@@ -3177,7 +3181,7 @@
           <a:p>
             <a:fld id="{52647F38-B617-4D2F-AE0A-013F0C4D2C57}" type="datetimeFigureOut">
               <a:rPr lang="en-US" dirty="0"/>
-              <a:t>8/29/2014</a:t>
+              <a:t>9/1/2014</a:t>
             </a:fld>
             <a:endParaRPr lang="en-US" dirty="0"/>
           </a:p>
@@ -3421,7 +3425,7 @@
             <a:fld id="{B61BEF0D-F0BB-DE4B-95CE-6DB70DBA9567}" type="datetimeFigureOut">
               <a:rPr lang="en-US" dirty="0"/>
               <a:pPr/>
-              <a:t>8/29/2014</a:t>
+              <a:t>9/1/2014</a:t>
             </a:fld>
             <a:endParaRPr lang="en-US" dirty="0"/>
           </a:p>
@@ -3715,7 +3719,7 @@
           <a:p>
             <a:fld id="{05BFA754-D5C3-4E66-96A6-867B257F58DC}" type="datetimeFigureOut">
               <a:rPr lang="en-US" dirty="0"/>
-              <a:t>8/29/2014</a:t>
+              <a:t>9/1/2014</a:t>
             </a:fld>
             <a:endParaRPr lang="en-US" dirty="0"/>
           </a:p>
@@ -4105,7 +4109,7 @@
             <a:fld id="{B61BEF0D-F0BB-DE4B-95CE-6DB70DBA9567}" type="datetimeFigureOut">
               <a:rPr lang="en-US" dirty="0"/>
               <a:pPr/>
-              <a:t>8/29/2014</a:t>
+              <a:t>9/1/2014</a:t>
             </a:fld>
             <a:endParaRPr lang="en-US" dirty="0"/>
           </a:p>
@@ -4251,7 +4255,7 @@
             <a:fld id="{B61BEF0D-F0BB-DE4B-95CE-6DB70DBA9567}" type="datetimeFigureOut">
               <a:rPr lang="en-US" dirty="0"/>
               <a:pPr/>
-              <a:t>8/29/2014</a:t>
+              <a:t>9/1/2014</a:t>
             </a:fld>
             <a:endParaRPr lang="en-US" dirty="0"/>
           </a:p>
@@ -4374,7 +4378,7 @@
             <a:fld id="{B61BEF0D-F0BB-DE4B-95CE-6DB70DBA9567}" type="datetimeFigureOut">
               <a:rPr lang="en-US" dirty="0"/>
               <a:pPr/>
-              <a:t>8/29/2014</a:t>
+              <a:t>9/1/2014</a:t>
             </a:fld>
             <a:endParaRPr lang="en-US" dirty="0"/>
           </a:p>
@@ -4626,7 +4630,7 @@
             <a:fld id="{B61BEF0D-F0BB-DE4B-95CE-6DB70DBA9567}" type="datetimeFigureOut">
               <a:rPr lang="en-US" dirty="0"/>
               <a:pPr/>
-              <a:t>8/29/2014</a:t>
+              <a:t>9/1/2014</a:t>
             </a:fld>
             <a:endParaRPr lang="en-US" dirty="0"/>
           </a:p>
@@ -4938,7 +4942,7 @@
             <a:fld id="{B61BEF0D-F0BB-DE4B-95CE-6DB70DBA9567}" type="datetimeFigureOut">
               <a:rPr lang="en-US" dirty="0"/>
               <a:pPr/>
-              <a:t>8/29/2014</a:t>
+              <a:t>9/1/2014</a:t>
             </a:fld>
             <a:endParaRPr lang="en-US" dirty="0"/>
           </a:p>
@@ -5286,7 +5290,7 @@
             <a:fld id="{B61BEF0D-F0BB-DE4B-95CE-6DB70DBA9567}" type="datetimeFigureOut">
               <a:rPr lang="en-US" dirty="0"/>
               <a:pPr/>
-              <a:t>8/29/2014</a:t>
+              <a:t>9/1/2014</a:t>
             </a:fld>
             <a:endParaRPr lang="en-US" dirty="0"/>
           </a:p>
@@ -6006,6 +6010,525 @@
           <a:p>
             <a:r>
               <a:rPr lang="en-SG" dirty="0" smtClean="0"/>
+              <a:t>Screenshots (Before)</a:t>
+            </a:r>
+            <a:endParaRPr lang="en-SG" dirty="0"/>
+          </a:p>
+        </p:txBody>
+      </p:sp>
+      <p:pic>
+        <p:nvPicPr>
+          <p:cNvPr id="7" name="Content Placeholder 6"/>
+          <p:cNvPicPr>
+            <a:picLocks noGrp="1" noChangeAspect="1"/>
+          </p:cNvPicPr>
+          <p:nvPr>
+            <p:ph idx="1"/>
+          </p:nvPr>
+        </p:nvPicPr>
+        <p:blipFill>
+          <a:blip r:embed="rId2">
+            <a:extLst>
+              <a:ext uri="{28A0092B-C50C-407E-A947-70E740481C1C}">
+                <a14:useLocalDpi xmlns:a14="http://schemas.microsoft.com/office/drawing/2010/main" val="0"/>
+              </a:ext>
+            </a:extLst>
+          </a:blip>
+          <a:stretch>
+            <a:fillRect/>
+          </a:stretch>
+        </p:blipFill>
+        <p:spPr>
+          <a:xfrm>
+            <a:off x="7981453" y="2299251"/>
+            <a:ext cx="3750365" cy="4558749"/>
+          </a:xfrm>
+        </p:spPr>
+      </p:pic>
+      <p:pic>
+        <p:nvPicPr>
+          <p:cNvPr id="6" name="Picture 5"/>
+          <p:cNvPicPr/>
+          <p:nvPr/>
+        </p:nvPicPr>
+        <p:blipFill>
+          <a:blip r:embed="rId3">
+            <a:extLst>
+              <a:ext uri="{28A0092B-C50C-407E-A947-70E740481C1C}">
+                <a14:useLocalDpi xmlns:a14="http://schemas.microsoft.com/office/drawing/2010/main" val="0"/>
+              </a:ext>
+            </a:extLst>
+          </a:blip>
+          <a:stretch>
+            <a:fillRect/>
+          </a:stretch>
+        </p:blipFill>
+        <p:spPr>
+          <a:xfrm>
+            <a:off x="446930" y="2299252"/>
+            <a:ext cx="4111818" cy="4558748"/>
+          </a:xfrm>
+          <a:prstGeom prst="rect">
+            <a:avLst/>
+          </a:prstGeom>
+        </p:spPr>
+      </p:pic>
+      <p:sp>
+        <p:nvSpPr>
+          <p:cNvPr id="8" name="TextBox 7"/>
+          <p:cNvSpPr txBox="1"/>
+          <p:nvPr/>
+        </p:nvSpPr>
+        <p:spPr>
+          <a:xfrm>
+            <a:off x="4724398" y="3379304"/>
+            <a:ext cx="3008243" cy="646331"/>
+          </a:xfrm>
+          <a:prstGeom prst="rect">
+            <a:avLst/>
+          </a:prstGeom>
+        </p:spPr>
+        <p:style>
+          <a:lnRef idx="2">
+            <a:schemeClr val="dk1"/>
+          </a:lnRef>
+          <a:fillRef idx="1">
+            <a:schemeClr val="lt1"/>
+          </a:fillRef>
+          <a:effectRef idx="0">
+            <a:schemeClr val="dk1"/>
+          </a:effectRef>
+          <a:fontRef idx="minor">
+            <a:schemeClr val="dk1"/>
+          </a:fontRef>
+        </p:style>
+        <p:txBody>
+          <a:bodyPr wrap="square" rtlCol="0">
+            <a:spAutoFit/>
+          </a:bodyPr>
+          <a:lstStyle/>
+          <a:p>
+            <a:r>
+              <a:rPr lang="en-SG" dirty="0" smtClean="0"/>
+              <a:t>			Initial Menu </a:t>
+            </a:r>
+            <a:r>
+              <a:rPr lang="en-SG" dirty="0" smtClean="0">
+                <a:sym typeface="Wingdings" panose="05000000000000000000" pitchFamily="2" charset="2"/>
+              </a:rPr>
+              <a:t></a:t>
+            </a:r>
+          </a:p>
+          <a:p>
+            <a:r>
+              <a:rPr lang="en-SG" dirty="0" smtClean="0">
+                <a:sym typeface="Wingdings" panose="05000000000000000000" pitchFamily="2" charset="2"/>
+              </a:rPr>
+              <a:t> Initial Gameplay</a:t>
+            </a:r>
+            <a:endParaRPr lang="en-SG" dirty="0"/>
+          </a:p>
+        </p:txBody>
+      </p:sp>
+    </p:spTree>
+    <p:extLst>
+      <p:ext uri="{BB962C8B-B14F-4D97-AF65-F5344CB8AC3E}">
+        <p14:creationId xmlns:p14="http://schemas.microsoft.com/office/powerpoint/2010/main" val="1086914032"/>
+      </p:ext>
+    </p:extLst>
+  </p:cSld>
+  <p:clrMapOvr>
+    <a:masterClrMapping/>
+  </p:clrMapOvr>
+  <p:timing>
+    <p:tnLst>
+      <p:par>
+        <p:cTn id="1" dur="indefinite" restart="never" nodeType="tmRoot"/>
+      </p:par>
+    </p:tnLst>
+  </p:timing>
+</p:sld>
+</file>
+
+<file path=ppt/slides/slide11.xml><?xml version="1.0" encoding="utf-8"?>
+<p:sld xmlns:a="http://schemas.openxmlformats.org/drawingml/2006/main" xmlns:r="http://schemas.openxmlformats.org/officeDocument/2006/relationships" xmlns:p="http://schemas.openxmlformats.org/presentationml/2006/main">
+  <p:cSld>
+    <p:spTree>
+      <p:nvGrpSpPr>
+        <p:cNvPr id="1" name=""/>
+        <p:cNvGrpSpPr/>
+        <p:nvPr/>
+      </p:nvGrpSpPr>
+      <p:grpSpPr>
+        <a:xfrm>
+          <a:off x="0" y="0"/>
+          <a:ext cx="0" cy="0"/>
+          <a:chOff x="0" y="0"/>
+          <a:chExt cx="0" cy="0"/>
+        </a:xfrm>
+      </p:grpSpPr>
+      <p:sp>
+        <p:nvSpPr>
+          <p:cNvPr id="2" name="Title 1"/>
+          <p:cNvSpPr>
+            <a:spLocks noGrp="1"/>
+          </p:cNvSpPr>
+          <p:nvPr>
+            <p:ph type="title"/>
+          </p:nvPr>
+        </p:nvSpPr>
+        <p:spPr/>
+        <p:txBody>
+          <a:bodyPr/>
+          <a:lstStyle/>
+          <a:p>
+            <a:r>
+              <a:rPr lang="en-SG" dirty="0" smtClean="0"/>
+              <a:t>Screenshots (After)</a:t>
+            </a:r>
+            <a:endParaRPr lang="en-SG" dirty="0"/>
+          </a:p>
+        </p:txBody>
+      </p:sp>
+      <p:sp>
+        <p:nvSpPr>
+          <p:cNvPr id="3" name="Content Placeholder 2"/>
+          <p:cNvSpPr>
+            <a:spLocks noGrp="1"/>
+          </p:cNvSpPr>
+          <p:nvPr>
+            <p:ph idx="1"/>
+          </p:nvPr>
+        </p:nvSpPr>
+        <p:spPr/>
+        <p:txBody>
+          <a:bodyPr/>
+          <a:lstStyle/>
+          <a:p>
+            <a:r>
+              <a:rPr lang="en-SG" dirty="0" smtClean="0"/>
+              <a:t>//final product of the game</a:t>
+            </a:r>
+            <a:endParaRPr lang="en-SG" dirty="0"/>
+          </a:p>
+        </p:txBody>
+      </p:sp>
+    </p:spTree>
+    <p:extLst>
+      <p:ext uri="{BB962C8B-B14F-4D97-AF65-F5344CB8AC3E}">
+        <p14:creationId xmlns:p14="http://schemas.microsoft.com/office/powerpoint/2010/main" val="285930456"/>
+      </p:ext>
+    </p:extLst>
+  </p:cSld>
+  <p:clrMapOvr>
+    <a:masterClrMapping/>
+  </p:clrMapOvr>
+  <p:timing>
+    <p:tnLst>
+      <p:par>
+        <p:cTn id="1" dur="indefinite" restart="never" nodeType="tmRoot"/>
+      </p:par>
+    </p:tnLst>
+  </p:timing>
+</p:sld>
+</file>
+
+<file path=ppt/slides/slide12.xml><?xml version="1.0" encoding="utf-8"?>
+<p:sld xmlns:a="http://schemas.openxmlformats.org/drawingml/2006/main" xmlns:r="http://schemas.openxmlformats.org/officeDocument/2006/relationships" xmlns:p="http://schemas.openxmlformats.org/presentationml/2006/main">
+  <p:cSld>
+    <p:spTree>
+      <p:nvGrpSpPr>
+        <p:cNvPr id="1" name=""/>
+        <p:cNvGrpSpPr/>
+        <p:nvPr/>
+      </p:nvGrpSpPr>
+      <p:grpSpPr>
+        <a:xfrm>
+          <a:off x="0" y="0"/>
+          <a:ext cx="0" cy="0"/>
+          <a:chOff x="0" y="0"/>
+          <a:chExt cx="0" cy="0"/>
+        </a:xfrm>
+      </p:grpSpPr>
+      <p:sp>
+        <p:nvSpPr>
+          <p:cNvPr id="2" name="Title 1"/>
+          <p:cNvSpPr>
+            <a:spLocks noGrp="1"/>
+          </p:cNvSpPr>
+          <p:nvPr>
+            <p:ph type="title"/>
+          </p:nvPr>
+        </p:nvSpPr>
+        <p:spPr/>
+        <p:txBody>
+          <a:bodyPr/>
+          <a:lstStyle/>
+          <a:p>
+            <a:r>
+              <a:rPr lang="en-SG" dirty="0" smtClean="0"/>
+              <a:t>Risks/Problems/Concerns</a:t>
+            </a:r>
+            <a:endParaRPr lang="en-SG" dirty="0"/>
+          </a:p>
+        </p:txBody>
+      </p:sp>
+      <p:sp>
+        <p:nvSpPr>
+          <p:cNvPr id="3" name="Content Placeholder 2"/>
+          <p:cNvSpPr>
+            <a:spLocks noGrp="1"/>
+          </p:cNvSpPr>
+          <p:nvPr>
+            <p:ph idx="1"/>
+          </p:nvPr>
+        </p:nvSpPr>
+        <p:spPr/>
+        <p:txBody>
+          <a:bodyPr/>
+          <a:lstStyle/>
+          <a:p>
+            <a:r>
+              <a:rPr lang="en-SG" dirty="0" smtClean="0"/>
+              <a:t>//to brainstorm some potential issues we are aware of….</a:t>
+            </a:r>
+            <a:endParaRPr lang="en-SG" dirty="0"/>
+          </a:p>
+        </p:txBody>
+      </p:sp>
+      <p:pic>
+        <p:nvPicPr>
+          <p:cNvPr id="4" name="Picture 3"/>
+          <p:cNvPicPr>
+            <a:picLocks noChangeAspect="1"/>
+          </p:cNvPicPr>
+          <p:nvPr/>
+        </p:nvPicPr>
+        <p:blipFill>
+          <a:blip r:embed="rId2">
+            <a:extLst>
+              <a:ext uri="{28A0092B-C50C-407E-A947-70E740481C1C}">
+                <a14:useLocalDpi xmlns:a14="http://schemas.microsoft.com/office/drawing/2010/main" val="0"/>
+              </a:ext>
+            </a:extLst>
+          </a:blip>
+          <a:stretch>
+            <a:fillRect/>
+          </a:stretch>
+        </p:blipFill>
+        <p:spPr>
+          <a:xfrm>
+            <a:off x="0" y="3829050"/>
+            <a:ext cx="2971800" cy="3028950"/>
+          </a:xfrm>
+          <a:prstGeom prst="rect">
+            <a:avLst/>
+          </a:prstGeom>
+        </p:spPr>
+      </p:pic>
+    </p:spTree>
+    <p:extLst>
+      <p:ext uri="{BB962C8B-B14F-4D97-AF65-F5344CB8AC3E}">
+        <p14:creationId xmlns:p14="http://schemas.microsoft.com/office/powerpoint/2010/main" val="29864862"/>
+      </p:ext>
+    </p:extLst>
+  </p:cSld>
+  <p:clrMapOvr>
+    <a:masterClrMapping/>
+  </p:clrMapOvr>
+  <p:timing>
+    <p:tnLst>
+      <p:par>
+        <p:cTn id="1" dur="indefinite" restart="never" nodeType="tmRoot"/>
+      </p:par>
+    </p:tnLst>
+  </p:timing>
+</p:sld>
+</file>
+
+<file path=ppt/slides/slide13.xml><?xml version="1.0" encoding="utf-8"?>
+<p:sld xmlns:a="http://schemas.openxmlformats.org/drawingml/2006/main" xmlns:r="http://schemas.openxmlformats.org/officeDocument/2006/relationships" xmlns:p="http://schemas.openxmlformats.org/presentationml/2006/main">
+  <p:cSld>
+    <p:spTree>
+      <p:nvGrpSpPr>
+        <p:cNvPr id="1" name=""/>
+        <p:cNvGrpSpPr/>
+        <p:nvPr/>
+      </p:nvGrpSpPr>
+      <p:grpSpPr>
+        <a:xfrm>
+          <a:off x="0" y="0"/>
+          <a:ext cx="0" cy="0"/>
+          <a:chOff x="0" y="0"/>
+          <a:chExt cx="0" cy="0"/>
+        </a:xfrm>
+      </p:grpSpPr>
+      <p:sp>
+        <p:nvSpPr>
+          <p:cNvPr id="2" name="Title 1"/>
+          <p:cNvSpPr>
+            <a:spLocks noGrp="1"/>
+          </p:cNvSpPr>
+          <p:nvPr>
+            <p:ph type="title"/>
+          </p:nvPr>
+        </p:nvSpPr>
+        <p:spPr/>
+        <p:txBody>
+          <a:bodyPr/>
+          <a:lstStyle/>
+          <a:p>
+            <a:r>
+              <a:rPr lang="en-SG" dirty="0" smtClean="0"/>
+              <a:t>Inspirations</a:t>
+            </a:r>
+            <a:endParaRPr lang="en-SG" dirty="0"/>
+          </a:p>
+        </p:txBody>
+      </p:sp>
+      <p:pic>
+        <p:nvPicPr>
+          <p:cNvPr id="4" name="Picture 3"/>
+          <p:cNvPicPr>
+            <a:picLocks noChangeAspect="1"/>
+          </p:cNvPicPr>
+          <p:nvPr/>
+        </p:nvPicPr>
+        <p:blipFill>
+          <a:blip r:embed="rId2">
+            <a:extLst>
+              <a:ext uri="{28A0092B-C50C-407E-A947-70E740481C1C}">
+                <a14:useLocalDpi xmlns:a14="http://schemas.microsoft.com/office/drawing/2010/main" val="0"/>
+              </a:ext>
+            </a:extLst>
+          </a:blip>
+          <a:stretch>
+            <a:fillRect/>
+          </a:stretch>
+        </p:blipFill>
+        <p:spPr>
+          <a:xfrm>
+            <a:off x="344557" y="1634065"/>
+            <a:ext cx="4139991" cy="4830417"/>
+          </a:xfrm>
+          <a:prstGeom prst="rect">
+            <a:avLst/>
+          </a:prstGeom>
+        </p:spPr>
+      </p:pic>
+      <p:pic>
+        <p:nvPicPr>
+          <p:cNvPr id="6" name="Content Placeholder 5"/>
+          <p:cNvPicPr>
+            <a:picLocks noGrp="1" noChangeAspect="1"/>
+          </p:cNvPicPr>
+          <p:nvPr>
+            <p:ph idx="1"/>
+          </p:nvPr>
+        </p:nvPicPr>
+        <p:blipFill>
+          <a:blip r:embed="rId3">
+            <a:extLst>
+              <a:ext uri="{28A0092B-C50C-407E-A947-70E740481C1C}">
+                <a14:useLocalDpi xmlns:a14="http://schemas.microsoft.com/office/drawing/2010/main" val="0"/>
+              </a:ext>
+            </a:extLst>
+          </a:blip>
+          <a:stretch>
+            <a:fillRect/>
+          </a:stretch>
+        </p:blipFill>
+        <p:spPr>
+          <a:xfrm>
+            <a:off x="7323826" y="2133600"/>
+            <a:ext cx="4038600" cy="4330882"/>
+          </a:xfrm>
+        </p:spPr>
+      </p:pic>
+      <p:pic>
+        <p:nvPicPr>
+          <p:cNvPr id="7" name="Picture 6"/>
+          <p:cNvPicPr>
+            <a:picLocks noChangeAspect="1"/>
+          </p:cNvPicPr>
+          <p:nvPr/>
+        </p:nvPicPr>
+        <p:blipFill>
+          <a:blip r:embed="rId4">
+            <a:extLst>
+              <a:ext uri="{28A0092B-C50C-407E-A947-70E740481C1C}">
+                <a14:useLocalDpi xmlns:a14="http://schemas.microsoft.com/office/drawing/2010/main" val="0"/>
+              </a:ext>
+            </a:extLst>
+          </a:blip>
+          <a:stretch>
+            <a:fillRect/>
+          </a:stretch>
+        </p:blipFill>
+        <p:spPr>
+          <a:xfrm>
+            <a:off x="3880573" y="2654482"/>
+            <a:ext cx="3810000" cy="3810000"/>
+          </a:xfrm>
+          <a:prstGeom prst="rect">
+            <a:avLst/>
+          </a:prstGeom>
+        </p:spPr>
+      </p:pic>
+    </p:spTree>
+    <p:extLst>
+      <p:ext uri="{BB962C8B-B14F-4D97-AF65-F5344CB8AC3E}">
+        <p14:creationId xmlns:p14="http://schemas.microsoft.com/office/powerpoint/2010/main" val="2584604006"/>
+      </p:ext>
+    </p:extLst>
+  </p:cSld>
+  <p:clrMapOvr>
+    <a:masterClrMapping/>
+  </p:clrMapOvr>
+  <p:timing>
+    <p:tnLst>
+      <p:par>
+        <p:cTn id="1" dur="indefinite" restart="never" nodeType="tmRoot"/>
+      </p:par>
+    </p:tnLst>
+  </p:timing>
+</p:sld>
+</file>
+
+<file path=ppt/slides/slide14.xml><?xml version="1.0" encoding="utf-8"?>
+<p:sld xmlns:a="http://schemas.openxmlformats.org/drawingml/2006/main" xmlns:r="http://schemas.openxmlformats.org/officeDocument/2006/relationships" xmlns:p="http://schemas.openxmlformats.org/presentationml/2006/main">
+  <p:cSld>
+    <p:spTree>
+      <p:nvGrpSpPr>
+        <p:cNvPr id="1" name=""/>
+        <p:cNvGrpSpPr/>
+        <p:nvPr/>
+      </p:nvGrpSpPr>
+      <p:grpSpPr>
+        <a:xfrm>
+          <a:off x="0" y="0"/>
+          <a:ext cx="0" cy="0"/>
+          <a:chOff x="0" y="0"/>
+          <a:chExt cx="0" cy="0"/>
+        </a:xfrm>
+      </p:grpSpPr>
+      <p:sp>
+        <p:nvSpPr>
+          <p:cNvPr id="2" name="Title 1"/>
+          <p:cNvSpPr>
+            <a:spLocks noGrp="1"/>
+          </p:cNvSpPr>
+          <p:nvPr>
+            <p:ph type="title"/>
+          </p:nvPr>
+        </p:nvSpPr>
+        <p:spPr/>
+        <p:txBody>
+          <a:bodyPr/>
+          <a:lstStyle/>
+          <a:p>
+            <a:r>
+              <a:rPr lang="en-SG" dirty="0" smtClean="0"/>
               <a:t>Inspirations</a:t>
             </a:r>
             <a:endParaRPr lang="en-SG" dirty="0"/>
@@ -6084,7 +6607,7 @@
 </p:sld>
 </file>
 
-<file path=ppt/slides/slide11.xml><?xml version="1.0" encoding="utf-8"?>
+<file path=ppt/slides/slide15.xml><?xml version="1.0" encoding="utf-8"?>
 <p:sld xmlns:a="http://schemas.openxmlformats.org/drawingml/2006/main" xmlns:r="http://schemas.openxmlformats.org/officeDocument/2006/relationships" xmlns:p="http://schemas.openxmlformats.org/presentationml/2006/main">
   <p:cSld>
     <p:spTree>
@@ -6189,7 +6712,7 @@
 </p:sld>
 </file>
 
-<file path=ppt/slides/slide12.xml><?xml version="1.0" encoding="utf-8"?>
+<file path=ppt/slides/slide16.xml><?xml version="1.0" encoding="utf-8"?>
 <p:sld xmlns:a="http://schemas.openxmlformats.org/drawingml/2006/main" xmlns:r="http://schemas.openxmlformats.org/officeDocument/2006/relationships" xmlns:p="http://schemas.openxmlformats.org/presentationml/2006/main">
   <p:cSld>
     <p:spTree>
@@ -6325,7 +6848,20 @@
           <a:p>
             <a:r>
               <a:rPr lang="en-SG" dirty="0" smtClean="0"/>
-              <a:t>Please note that the pictures provided in this presentation do not intend to infringe any copyright. Credits are given to the sources.</a:t>
+              <a:t>Please note that the pictures provided in this presentation do not intend to infringe any copyright. Credits are given to the sources</a:t>
+            </a:r>
+            <a:r>
+              <a:rPr lang="en-SG" dirty="0" smtClean="0"/>
+              <a:t>.</a:t>
+            </a:r>
+          </a:p>
+          <a:p>
+            <a:endParaRPr lang="en-SG" dirty="0"/>
+          </a:p>
+          <a:p>
+            <a:r>
+              <a:rPr lang="en-SG" dirty="0" smtClean="0"/>
+              <a:t>Our individual tasks and timeline</a:t>
             </a:r>
             <a:endParaRPr lang="en-SG" dirty="0"/>
           </a:p>
@@ -6501,12 +7037,31 @@
         </p:nvSpPr>
         <p:spPr/>
         <p:txBody>
-          <a:bodyPr/>
+          <a:bodyPr>
+            <a:normAutofit lnSpcReduction="10000"/>
+          </a:bodyPr>
           <a:lstStyle/>
           <a:p>
             <a:r>
               <a:rPr lang="en-SG" dirty="0" smtClean="0"/>
-              <a:t>Gameplay Samples</a:t>
+              <a:t>Our Tasks (extract from proposal)</a:t>
+            </a:r>
+          </a:p>
+          <a:p>
+            <a:r>
+              <a:rPr lang="en-SG" dirty="0" smtClean="0"/>
+              <a:t>Project Schedule (from excel sheet)</a:t>
+            </a:r>
+            <a:endParaRPr lang="en-SG" dirty="0" smtClean="0"/>
+          </a:p>
+          <a:p>
+            <a:r>
+              <a:rPr lang="en-SG" dirty="0" smtClean="0"/>
+              <a:t>Gameplay </a:t>
+            </a:r>
+            <a:r>
+              <a:rPr lang="en-SG" dirty="0" smtClean="0"/>
+              <a:t>Samples</a:t>
             </a:r>
           </a:p>
           <a:p>
@@ -6530,15 +7085,13 @@
           <a:p>
             <a:r>
               <a:rPr lang="en-SG" dirty="0" smtClean="0"/>
-              <a:t>Random Inspirations</a:t>
-            </a:r>
-          </a:p>
-          <a:p>
-            <a:r>
-              <a:rPr lang="en-SG" smtClean="0"/>
-              <a:t>Q&amp;A</a:t>
-            </a:r>
-            <a:endParaRPr lang="en-SG" dirty="0"/>
+              <a:t>Random </a:t>
+            </a:r>
+            <a:r>
+              <a:rPr lang="en-SG" dirty="0" smtClean="0"/>
+              <a:t>Inspirations</a:t>
+            </a:r>
+            <a:endParaRPr lang="en-SG" dirty="0" smtClean="0"/>
           </a:p>
         </p:txBody>
       </p:sp>
@@ -6564,8 +7117,8 @@
         </p:blipFill>
         <p:spPr>
           <a:xfrm>
-            <a:off x="5460521" y="2225614"/>
-            <a:ext cx="6185140" cy="4113722"/>
+            <a:off x="5857335" y="2225614"/>
+            <a:ext cx="5788325" cy="4113722"/>
           </a:xfrm>
           <a:prstGeom prst="rect">
             <a:avLst/>
@@ -6626,7 +7179,7 @@
           <a:p>
             <a:r>
               <a:rPr lang="en-SG" dirty="0" smtClean="0"/>
-              <a:t>Gameplay Samples</a:t>
+              <a:t>Our Tasks</a:t>
             </a:r>
             <a:endParaRPr lang="en-SG" dirty="0"/>
           </a:p>
@@ -6647,27 +7200,36 @@
           <a:bodyPr/>
           <a:lstStyle/>
           <a:p>
-            <a:endParaRPr lang="en-SG"/>
+            <a:r>
+              <a:rPr lang="en-SG" dirty="0" smtClean="0"/>
+              <a:t>Problem encounter and how we solved</a:t>
+            </a:r>
+          </a:p>
+          <a:p>
+            <a:r>
+              <a:rPr lang="en-SG" dirty="0" smtClean="0"/>
+              <a:t>How we improve our project better?</a:t>
+            </a:r>
+          </a:p>
+          <a:p>
+            <a:r>
+              <a:rPr lang="en-SG" dirty="0" smtClean="0"/>
+              <a:t>SML and who did what.</a:t>
+            </a:r>
+            <a:endParaRPr lang="en-SG" dirty="0"/>
           </a:p>
         </p:txBody>
       </p:sp>
     </p:spTree>
     <p:extLst>
       <p:ext uri="{BB962C8B-B14F-4D97-AF65-F5344CB8AC3E}">
-        <p14:creationId xmlns:p14="http://schemas.microsoft.com/office/powerpoint/2010/main" val="867824873"/>
+        <p14:creationId xmlns:p14="http://schemas.microsoft.com/office/powerpoint/2010/main" val="2705291013"/>
       </p:ext>
     </p:extLst>
   </p:cSld>
   <p:clrMapOvr>
     <a:masterClrMapping/>
   </p:clrMapOvr>
-  <p:timing>
-    <p:tnLst>
-      <p:par>
-        <p:cTn id="1" dur="indefinite" restart="never" nodeType="tmRoot"/>
-      </p:par>
-    </p:tnLst>
-  </p:timing>
 </p:sld>
 </file>
 
@@ -6705,121 +7267,30 @@
           <a:p>
             <a:r>
               <a:rPr lang="en-SG" dirty="0" smtClean="0"/>
-              <a:t>Screenshots (Before)</a:t>
+              <a:t>Our Tasks</a:t>
             </a:r>
             <a:endParaRPr lang="en-SG" dirty="0"/>
           </a:p>
         </p:txBody>
       </p:sp>
-      <p:pic>
-        <p:nvPicPr>
-          <p:cNvPr id="7" name="Content Placeholder 6"/>
-          <p:cNvPicPr>
-            <a:picLocks noGrp="1" noChangeAspect="1"/>
-          </p:cNvPicPr>
+      <p:sp>
+        <p:nvSpPr>
+          <p:cNvPr id="3" name="Content Placeholder 2"/>
+          <p:cNvSpPr>
+            <a:spLocks noGrp="1"/>
+          </p:cNvSpPr>
           <p:nvPr>
             <p:ph idx="1"/>
           </p:nvPr>
-        </p:nvPicPr>
-        <p:blipFill>
-          <a:blip r:embed="rId2">
-            <a:extLst>
-              <a:ext uri="{28A0092B-C50C-407E-A947-70E740481C1C}">
-                <a14:useLocalDpi xmlns:a14="http://schemas.microsoft.com/office/drawing/2010/main" val="0"/>
-              </a:ext>
-            </a:extLst>
-          </a:blip>
-          <a:stretch>
-            <a:fillRect/>
-          </a:stretch>
-        </p:blipFill>
-        <p:spPr>
-          <a:xfrm>
-            <a:off x="7981453" y="2299251"/>
-            <a:ext cx="3750365" cy="4558749"/>
-          </a:xfrm>
-        </p:spPr>
-      </p:pic>
-      <p:pic>
-        <p:nvPicPr>
-          <p:cNvPr id="6" name="Picture 5"/>
-          <p:cNvPicPr/>
-          <p:nvPr/>
-        </p:nvPicPr>
-        <p:blipFill>
-          <a:blip r:embed="rId3">
-            <a:extLst>
-              <a:ext uri="{28A0092B-C50C-407E-A947-70E740481C1C}">
-                <a14:useLocalDpi xmlns:a14="http://schemas.microsoft.com/office/drawing/2010/main" val="0"/>
-              </a:ext>
-            </a:extLst>
-          </a:blip>
-          <a:stretch>
-            <a:fillRect/>
-          </a:stretch>
-        </p:blipFill>
-        <p:spPr>
-          <a:xfrm>
-            <a:off x="446930" y="2299252"/>
-            <a:ext cx="4111818" cy="4558748"/>
-          </a:xfrm>
-          <a:prstGeom prst="rect">
-            <a:avLst/>
-          </a:prstGeom>
-        </p:spPr>
-      </p:pic>
-      <p:sp>
-        <p:nvSpPr>
-          <p:cNvPr id="8" name="TextBox 7"/>
-          <p:cNvSpPr txBox="1"/>
-          <p:nvPr/>
-        </p:nvSpPr>
-        <p:spPr>
-          <a:xfrm>
-            <a:off x="4724398" y="3379304"/>
-            <a:ext cx="3008243" cy="646331"/>
-          </a:xfrm>
-          <a:prstGeom prst="rect">
-            <a:avLst/>
-          </a:prstGeom>
-        </p:spPr>
-        <p:style>
-          <a:lnRef idx="2">
-            <a:schemeClr val="dk1"/>
-          </a:lnRef>
-          <a:fillRef idx="1">
-            <a:schemeClr val="lt1"/>
-          </a:fillRef>
-          <a:effectRef idx="0">
-            <a:schemeClr val="dk1"/>
-          </a:effectRef>
-          <a:fontRef idx="minor">
-            <a:schemeClr val="dk1"/>
-          </a:fontRef>
-        </p:style>
-        <p:txBody>
-          <a:bodyPr wrap="square" rtlCol="0">
-            <a:spAutoFit/>
-          </a:bodyPr>
+        </p:nvSpPr>
+        <p:spPr/>
+        <p:txBody>
+          <a:bodyPr/>
           <a:lstStyle/>
           <a:p>
             <a:r>
               <a:rPr lang="en-SG" dirty="0" smtClean="0"/>
-              <a:t>			Initial Menu </a:t>
-            </a:r>
-            <a:r>
-              <a:rPr lang="en-SG" dirty="0" smtClean="0">
-                <a:sym typeface="Wingdings" panose="05000000000000000000" pitchFamily="2" charset="2"/>
-              </a:rPr>
-              <a:t></a:t>
-            </a:r>
-          </a:p>
-          <a:p>
-            <a:r>
-              <a:rPr lang="en-SG" dirty="0" smtClean="0">
-                <a:sym typeface="Wingdings" panose="05000000000000000000" pitchFamily="2" charset="2"/>
-              </a:rPr>
-              <a:t> Initial Gameplay</a:t>
+              <a:t>Predicted (time taken)</a:t>
             </a:r>
             <a:endParaRPr lang="en-SG" dirty="0"/>
           </a:p>
@@ -6828,20 +7299,13 @@
     </p:spTree>
     <p:extLst>
       <p:ext uri="{BB962C8B-B14F-4D97-AF65-F5344CB8AC3E}">
-        <p14:creationId xmlns:p14="http://schemas.microsoft.com/office/powerpoint/2010/main" val="1086914032"/>
+        <p14:creationId xmlns:p14="http://schemas.microsoft.com/office/powerpoint/2010/main" val="2993240827"/>
       </p:ext>
     </p:extLst>
   </p:cSld>
   <p:clrMapOvr>
     <a:masterClrMapping/>
   </p:clrMapOvr>
-  <p:timing>
-    <p:tnLst>
-      <p:par>
-        <p:cTn id="1" dur="indefinite" restart="never" nodeType="tmRoot"/>
-      </p:par>
-    </p:tnLst>
-  </p:timing>
 </p:sld>
 </file>
 
@@ -6879,7 +7343,7 @@
           <a:p>
             <a:r>
               <a:rPr lang="en-SG" dirty="0" smtClean="0"/>
-              <a:t>Screenshots (After)</a:t>
+              <a:t>Our Tasks</a:t>
             </a:r>
             <a:endParaRPr lang="en-SG" dirty="0"/>
           </a:p>
@@ -6902,7 +7366,7 @@
           <a:p>
             <a:r>
               <a:rPr lang="en-SG" dirty="0" smtClean="0"/>
-              <a:t>//final product of the game</a:t>
+              <a:t>Actual figures (this might not be a relevant slide.)</a:t>
             </a:r>
             <a:endParaRPr lang="en-SG" dirty="0"/>
           </a:p>
@@ -6911,20 +7375,13 @@
     </p:spTree>
     <p:extLst>
       <p:ext uri="{BB962C8B-B14F-4D97-AF65-F5344CB8AC3E}">
-        <p14:creationId xmlns:p14="http://schemas.microsoft.com/office/powerpoint/2010/main" val="285930456"/>
+        <p14:creationId xmlns:p14="http://schemas.microsoft.com/office/powerpoint/2010/main" val="2213794591"/>
       </p:ext>
     </p:extLst>
   </p:cSld>
   <p:clrMapOvr>
     <a:masterClrMapping/>
   </p:clrMapOvr>
-  <p:timing>
-    <p:tnLst>
-      <p:par>
-        <p:cTn id="1" dur="indefinite" restart="never" nodeType="tmRoot"/>
-      </p:par>
-    </p:tnLst>
-  </p:timing>
 </p:sld>
 </file>
 
@@ -6962,7 +7419,7 @@
           <a:p>
             <a:r>
               <a:rPr lang="en-SG" dirty="0" smtClean="0"/>
-              <a:t>Risks/Problems/Concerns</a:t>
+              <a:t>Project Schedule</a:t>
             </a:r>
             <a:endParaRPr lang="en-SG" dirty="0"/>
           </a:p>
@@ -6985,59 +7442,22 @@
           <a:p>
             <a:r>
               <a:rPr lang="en-SG" dirty="0" smtClean="0"/>
-              <a:t>//to brainstorm some potential issues we are aware of….</a:t>
+              <a:t>Insert Gantt Chart here…</a:t>
             </a:r>
             <a:endParaRPr lang="en-SG" dirty="0"/>
           </a:p>
         </p:txBody>
       </p:sp>
-      <p:pic>
-        <p:nvPicPr>
-          <p:cNvPr id="4" name="Picture 3"/>
-          <p:cNvPicPr>
-            <a:picLocks noChangeAspect="1"/>
-          </p:cNvPicPr>
-          <p:nvPr/>
-        </p:nvPicPr>
-        <p:blipFill>
-          <a:blip r:embed="rId2">
-            <a:extLst>
-              <a:ext uri="{28A0092B-C50C-407E-A947-70E740481C1C}">
-                <a14:useLocalDpi xmlns:a14="http://schemas.microsoft.com/office/drawing/2010/main" val="0"/>
-              </a:ext>
-            </a:extLst>
-          </a:blip>
-          <a:stretch>
-            <a:fillRect/>
-          </a:stretch>
-        </p:blipFill>
-        <p:spPr>
-          <a:xfrm>
-            <a:off x="0" y="3829050"/>
-            <a:ext cx="2971800" cy="3028950"/>
-          </a:xfrm>
-          <a:prstGeom prst="rect">
-            <a:avLst/>
-          </a:prstGeom>
-        </p:spPr>
-      </p:pic>
     </p:spTree>
     <p:extLst>
       <p:ext uri="{BB962C8B-B14F-4D97-AF65-F5344CB8AC3E}">
-        <p14:creationId xmlns:p14="http://schemas.microsoft.com/office/powerpoint/2010/main" val="29864862"/>
+        <p14:creationId xmlns:p14="http://schemas.microsoft.com/office/powerpoint/2010/main" val="2477180559"/>
       </p:ext>
     </p:extLst>
   </p:cSld>
   <p:clrMapOvr>
     <a:masterClrMapping/>
   </p:clrMapOvr>
-  <p:timing>
-    <p:tnLst>
-      <p:par>
-        <p:cTn id="1" dur="indefinite" restart="never" nodeType="tmRoot"/>
-      </p:par>
-    </p:tnLst>
-  </p:timing>
 </p:sld>
 </file>
 
@@ -7075,105 +7495,35 @@
           <a:p>
             <a:r>
               <a:rPr lang="en-SG" dirty="0" smtClean="0"/>
-              <a:t>Inspirations</a:t>
+              <a:t>Gameplay Samples</a:t>
             </a:r>
             <a:endParaRPr lang="en-SG" dirty="0"/>
           </a:p>
         </p:txBody>
       </p:sp>
-      <p:pic>
-        <p:nvPicPr>
-          <p:cNvPr id="4" name="Picture 3"/>
-          <p:cNvPicPr>
-            <a:picLocks noChangeAspect="1"/>
-          </p:cNvPicPr>
-          <p:nvPr/>
-        </p:nvPicPr>
-        <p:blipFill>
-          <a:blip r:embed="rId2">
-            <a:extLst>
-              <a:ext uri="{28A0092B-C50C-407E-A947-70E740481C1C}">
-                <a14:useLocalDpi xmlns:a14="http://schemas.microsoft.com/office/drawing/2010/main" val="0"/>
-              </a:ext>
-            </a:extLst>
-          </a:blip>
-          <a:stretch>
-            <a:fillRect/>
-          </a:stretch>
-        </p:blipFill>
-        <p:spPr>
-          <a:xfrm>
-            <a:off x="344557" y="1634065"/>
-            <a:ext cx="4139991" cy="4830417"/>
-          </a:xfrm>
-          <a:prstGeom prst="rect">
-            <a:avLst/>
-          </a:prstGeom>
-        </p:spPr>
-      </p:pic>
-      <p:pic>
-        <p:nvPicPr>
-          <p:cNvPr id="6" name="Content Placeholder 5"/>
-          <p:cNvPicPr>
-            <a:picLocks noGrp="1" noChangeAspect="1"/>
-          </p:cNvPicPr>
+      <p:sp>
+        <p:nvSpPr>
+          <p:cNvPr id="3" name="Content Placeholder 2"/>
+          <p:cNvSpPr>
+            <a:spLocks noGrp="1"/>
+          </p:cNvSpPr>
           <p:nvPr>
             <p:ph idx="1"/>
           </p:nvPr>
-        </p:nvPicPr>
-        <p:blipFill>
-          <a:blip r:embed="rId3">
-            <a:extLst>
-              <a:ext uri="{28A0092B-C50C-407E-A947-70E740481C1C}">
-                <a14:useLocalDpi xmlns:a14="http://schemas.microsoft.com/office/drawing/2010/main" val="0"/>
-              </a:ext>
-            </a:extLst>
-          </a:blip>
-          <a:stretch>
-            <a:fillRect/>
-          </a:stretch>
-        </p:blipFill>
-        <p:spPr>
-          <a:xfrm>
-            <a:off x="7323826" y="2133600"/>
-            <a:ext cx="4038600" cy="4330882"/>
-          </a:xfrm>
-        </p:spPr>
-      </p:pic>
-      <p:pic>
-        <p:nvPicPr>
-          <p:cNvPr id="7" name="Picture 6"/>
-          <p:cNvPicPr>
-            <a:picLocks noChangeAspect="1"/>
-          </p:cNvPicPr>
-          <p:nvPr/>
-        </p:nvPicPr>
-        <p:blipFill>
-          <a:blip r:embed="rId4">
-            <a:extLst>
-              <a:ext uri="{28A0092B-C50C-407E-A947-70E740481C1C}">
-                <a14:useLocalDpi xmlns:a14="http://schemas.microsoft.com/office/drawing/2010/main" val="0"/>
-              </a:ext>
-            </a:extLst>
-          </a:blip>
-          <a:stretch>
-            <a:fillRect/>
-          </a:stretch>
-        </p:blipFill>
-        <p:spPr>
-          <a:xfrm>
-            <a:off x="3880573" y="2654482"/>
-            <a:ext cx="3810000" cy="3810000"/>
-          </a:xfrm>
-          <a:prstGeom prst="rect">
-            <a:avLst/>
-          </a:prstGeom>
-        </p:spPr>
-      </p:pic>
+        </p:nvSpPr>
+        <p:spPr/>
+        <p:txBody>
+          <a:bodyPr/>
+          <a:lstStyle/>
+          <a:p>
+            <a:endParaRPr lang="en-SG"/>
+          </a:p>
+        </p:txBody>
+      </p:sp>
     </p:spTree>
     <p:extLst>
       <p:ext uri="{BB962C8B-B14F-4D97-AF65-F5344CB8AC3E}">
-        <p14:creationId xmlns:p14="http://schemas.microsoft.com/office/powerpoint/2010/main" val="2584604006"/>
+        <p14:creationId xmlns:p14="http://schemas.microsoft.com/office/powerpoint/2010/main" val="867824873"/>
       </p:ext>
     </p:extLst>
   </p:cSld>

</xml_diff>